<commit_message>
Added Figure for ESN with control
</commit_message>
<xml_diff>
--- a/Figures_Paper/Overview.pptx
+++ b/Figures_Paper/Overview.pptx
@@ -6,6 +6,7 @@
   </p:sldMasterIdLst>
   <p:sldIdLst>
     <p:sldId id="256" r:id="rId2"/>
+    <p:sldId id="257" r:id="rId3"/>
   </p:sldIdLst>
   <p:sldSz cx="12192000" cy="6858000"/>
   <p:notesSz cx="6858000" cy="9144000"/>
@@ -104,6 +105,11 @@
       </a:defRPr>
     </a:lvl9pPr>
   </p:defaultTextStyle>
+  <p:extLst>
+    <p:ext uri="{EFAFB233-063F-42B5-8137-9DF3F51BA10A}">
+      <p15:sldGuideLst xmlns:p15="http://schemas.microsoft.com/office/powerpoint/2012/main"/>
+    </p:ext>
+  </p:extLst>
 </p:presentation>
 </file>
 
@@ -238,7 +244,7 @@
           <a:p>
             <a:fld id="{6D3EBFE4-0E72-47F8-BA46-312F5F36F48F}" type="datetimeFigureOut">
               <a:rPr lang="de-DE" smtClean="0"/>
-              <a:t>15.07.2020</a:t>
+              <a:t>24.07.2020</a:t>
             </a:fld>
             <a:endParaRPr lang="de-DE"/>
           </a:p>
@@ -408,7 +414,7 @@
           <a:p>
             <a:fld id="{6D3EBFE4-0E72-47F8-BA46-312F5F36F48F}" type="datetimeFigureOut">
               <a:rPr lang="de-DE" smtClean="0"/>
-              <a:t>15.07.2020</a:t>
+              <a:t>24.07.2020</a:t>
             </a:fld>
             <a:endParaRPr lang="de-DE"/>
           </a:p>
@@ -588,7 +594,7 @@
           <a:p>
             <a:fld id="{6D3EBFE4-0E72-47F8-BA46-312F5F36F48F}" type="datetimeFigureOut">
               <a:rPr lang="de-DE" smtClean="0"/>
-              <a:t>15.07.2020</a:t>
+              <a:t>24.07.2020</a:t>
             </a:fld>
             <a:endParaRPr lang="de-DE"/>
           </a:p>
@@ -758,7 +764,7 @@
           <a:p>
             <a:fld id="{6D3EBFE4-0E72-47F8-BA46-312F5F36F48F}" type="datetimeFigureOut">
               <a:rPr lang="de-DE" smtClean="0"/>
-              <a:t>15.07.2020</a:t>
+              <a:t>24.07.2020</a:t>
             </a:fld>
             <a:endParaRPr lang="de-DE"/>
           </a:p>
@@ -1004,7 +1010,7 @@
           <a:p>
             <a:fld id="{6D3EBFE4-0E72-47F8-BA46-312F5F36F48F}" type="datetimeFigureOut">
               <a:rPr lang="de-DE" smtClean="0"/>
-              <a:t>15.07.2020</a:t>
+              <a:t>24.07.2020</a:t>
             </a:fld>
             <a:endParaRPr lang="de-DE"/>
           </a:p>
@@ -1236,7 +1242,7 @@
           <a:p>
             <a:fld id="{6D3EBFE4-0E72-47F8-BA46-312F5F36F48F}" type="datetimeFigureOut">
               <a:rPr lang="de-DE" smtClean="0"/>
-              <a:t>15.07.2020</a:t>
+              <a:t>24.07.2020</a:t>
             </a:fld>
             <a:endParaRPr lang="de-DE"/>
           </a:p>
@@ -1603,7 +1609,7 @@
           <a:p>
             <a:fld id="{6D3EBFE4-0E72-47F8-BA46-312F5F36F48F}" type="datetimeFigureOut">
               <a:rPr lang="de-DE" smtClean="0"/>
-              <a:t>15.07.2020</a:t>
+              <a:t>24.07.2020</a:t>
             </a:fld>
             <a:endParaRPr lang="de-DE"/>
           </a:p>
@@ -1721,7 +1727,7 @@
           <a:p>
             <a:fld id="{6D3EBFE4-0E72-47F8-BA46-312F5F36F48F}" type="datetimeFigureOut">
               <a:rPr lang="de-DE" smtClean="0"/>
-              <a:t>15.07.2020</a:t>
+              <a:t>24.07.2020</a:t>
             </a:fld>
             <a:endParaRPr lang="de-DE"/>
           </a:p>
@@ -1816,7 +1822,7 @@
           <a:p>
             <a:fld id="{6D3EBFE4-0E72-47F8-BA46-312F5F36F48F}" type="datetimeFigureOut">
               <a:rPr lang="de-DE" smtClean="0"/>
-              <a:t>15.07.2020</a:t>
+              <a:t>24.07.2020</a:t>
             </a:fld>
             <a:endParaRPr lang="de-DE"/>
           </a:p>
@@ -2093,7 +2099,7 @@
           <a:p>
             <a:fld id="{6D3EBFE4-0E72-47F8-BA46-312F5F36F48F}" type="datetimeFigureOut">
               <a:rPr lang="de-DE" smtClean="0"/>
-              <a:t>15.07.2020</a:t>
+              <a:t>24.07.2020</a:t>
             </a:fld>
             <a:endParaRPr lang="de-DE"/>
           </a:p>
@@ -2346,7 +2352,7 @@
           <a:p>
             <a:fld id="{6D3EBFE4-0E72-47F8-BA46-312F5F36F48F}" type="datetimeFigureOut">
               <a:rPr lang="de-DE" smtClean="0"/>
-              <a:t>15.07.2020</a:t>
+              <a:t>24.07.2020</a:t>
             </a:fld>
             <a:endParaRPr lang="de-DE"/>
           </a:p>
@@ -2559,7 +2565,7 @@
           <a:p>
             <a:fld id="{6D3EBFE4-0E72-47F8-BA46-312F5F36F48F}" type="datetimeFigureOut">
               <a:rPr lang="de-DE" smtClean="0"/>
-              <a:t>15.07.2020</a:t>
+              <a:t>24.07.2020</a:t>
             </a:fld>
             <a:endParaRPr lang="de-DE"/>
           </a:p>
@@ -3891,6 +3897,2713 @@
 </p:sld>
 </file>
 
+<file path=ppt/slides/slide2.xml><?xml version="1.0" encoding="utf-8"?>
+<p:sld xmlns:a="http://schemas.openxmlformats.org/drawingml/2006/main" xmlns:r="http://schemas.openxmlformats.org/officeDocument/2006/relationships" xmlns:p="http://schemas.openxmlformats.org/presentationml/2006/main">
+  <p:cSld>
+    <p:spTree>
+      <p:nvGrpSpPr>
+        <p:cNvPr id="1" name=""/>
+        <p:cNvGrpSpPr/>
+        <p:nvPr/>
+      </p:nvGrpSpPr>
+      <p:grpSpPr>
+        <a:xfrm>
+          <a:off x="0" y="0"/>
+          <a:ext cx="0" cy="0"/>
+          <a:chOff x="0" y="0"/>
+          <a:chExt cx="0" cy="0"/>
+        </a:xfrm>
+      </p:grpSpPr>
+      <p:sp>
+        <p:nvSpPr>
+          <p:cNvPr id="4" name="Ellipse 3"/>
+          <p:cNvSpPr/>
+          <p:nvPr/>
+        </p:nvSpPr>
+        <p:spPr>
+          <a:xfrm>
+            <a:off x="4107050" y="1379349"/>
+            <a:ext cx="3600000" cy="3600000"/>
+          </a:xfrm>
+          <a:prstGeom prst="ellipse">
+            <a:avLst/>
+          </a:prstGeom>
+          <a:solidFill>
+            <a:schemeClr val="accent3">
+              <a:lumMod val="40000"/>
+              <a:lumOff val="60000"/>
+            </a:schemeClr>
+          </a:solidFill>
+          <a:ln>
+            <a:solidFill>
+              <a:schemeClr val="accent1">
+                <a:lumMod val="50000"/>
+              </a:schemeClr>
+            </a:solidFill>
+          </a:ln>
+        </p:spPr>
+        <p:style>
+          <a:lnRef idx="2">
+            <a:schemeClr val="accent1">
+              <a:shade val="50000"/>
+            </a:schemeClr>
+          </a:lnRef>
+          <a:fillRef idx="1">
+            <a:schemeClr val="accent1"/>
+          </a:fillRef>
+          <a:effectRef idx="0">
+            <a:schemeClr val="accent1"/>
+          </a:effectRef>
+          <a:fontRef idx="minor">
+            <a:schemeClr val="lt1"/>
+          </a:fontRef>
+        </p:style>
+        <p:txBody>
+          <a:bodyPr rtlCol="0" anchor="ctr"/>
+          <a:lstStyle/>
+          <a:p>
+            <a:pPr algn="ctr"/>
+            <a:endParaRPr lang="de-DE"/>
+          </a:p>
+        </p:txBody>
+      </p:sp>
+      <mc:AlternateContent xmlns:mc="http://schemas.openxmlformats.org/markup-compatibility/2006">
+        <mc:Choice xmlns:a14="http://schemas.microsoft.com/office/drawing/2010/main" Requires="a14">
+          <p:sp>
+            <p:nvSpPr>
+              <p:cNvPr id="5" name="Abgerundetes Rechteck 4"/>
+              <p:cNvSpPr/>
+              <p:nvPr/>
+            </p:nvSpPr>
+            <p:spPr>
+              <a:xfrm>
+                <a:off x="2433233" y="1379349"/>
+                <a:ext cx="712919" cy="3600000"/>
+              </a:xfrm>
+              <a:prstGeom prst="roundRect">
+                <a:avLst/>
+              </a:prstGeom>
+              <a:solidFill>
+                <a:schemeClr val="accent3">
+                  <a:lumMod val="40000"/>
+                  <a:lumOff val="60000"/>
+                </a:schemeClr>
+              </a:solidFill>
+              <a:ln>
+                <a:solidFill>
+                  <a:schemeClr val="accent1">
+                    <a:lumMod val="50000"/>
+                  </a:schemeClr>
+                </a:solidFill>
+              </a:ln>
+            </p:spPr>
+            <p:style>
+              <a:lnRef idx="2">
+                <a:schemeClr val="accent1">
+                  <a:shade val="50000"/>
+                </a:schemeClr>
+              </a:lnRef>
+              <a:fillRef idx="1">
+                <a:schemeClr val="accent1"/>
+              </a:fillRef>
+              <a:effectRef idx="0">
+                <a:schemeClr val="accent1"/>
+              </a:effectRef>
+              <a:fontRef idx="minor">
+                <a:schemeClr val="lt1"/>
+              </a:fontRef>
+            </p:style>
+            <p:txBody>
+              <a:bodyPr rtlCol="0" anchor="ctr"/>
+              <a:lstStyle/>
+              <a:p>
+                <a:pPr algn="ctr"/>
+                <a14:m>
+                  <m:oMathPara xmlns:m="http://schemas.openxmlformats.org/officeDocument/2006/math">
+                    <m:oMathParaPr>
+                      <m:jc m:val="centerGroup"/>
+                    </m:oMathParaPr>
+                    <m:oMath xmlns:m="http://schemas.openxmlformats.org/officeDocument/2006/math">
+                      <m:sSub>
+                        <m:sSubPr>
+                          <m:ctrlPr>
+                            <a:rPr lang="de-DE" sz="2000" b="1" i="1" smtClean="0">
+                              <a:solidFill>
+                                <a:schemeClr val="tx2">
+                                  <a:lumMod val="50000"/>
+                                </a:schemeClr>
+                              </a:solidFill>
+                              <a:latin typeface="Cambria Math" panose="02040503050406030204" pitchFamily="18" charset="0"/>
+                            </a:rPr>
+                          </m:ctrlPr>
+                        </m:sSubPr>
+                        <m:e>
+                          <m:r>
+                            <a:rPr lang="de-DE" sz="2000" b="1" i="1" smtClean="0">
+                              <a:solidFill>
+                                <a:schemeClr val="tx2">
+                                  <a:lumMod val="50000"/>
+                                </a:schemeClr>
+                              </a:solidFill>
+                              <a:latin typeface="Cambria Math" panose="02040503050406030204" pitchFamily="18" charset="0"/>
+                            </a:rPr>
+                            <m:t>𝑾</m:t>
+                          </m:r>
+                        </m:e>
+                        <m:sub>
+                          <m:r>
+                            <a:rPr lang="de-DE" sz="2000" b="1" i="1" smtClean="0">
+                              <a:solidFill>
+                                <a:schemeClr val="tx2">
+                                  <a:lumMod val="50000"/>
+                                </a:schemeClr>
+                              </a:solidFill>
+                              <a:latin typeface="Cambria Math" panose="02040503050406030204" pitchFamily="18" charset="0"/>
+                            </a:rPr>
+                            <m:t>𝒊𝒏</m:t>
+                          </m:r>
+                        </m:sub>
+                      </m:sSub>
+                    </m:oMath>
+                  </m:oMathPara>
+                </a14:m>
+                <a:endParaRPr lang="de-DE" sz="2000" b="1" dirty="0"/>
+              </a:p>
+            </p:txBody>
+          </p:sp>
+        </mc:Choice>
+        <mc:Fallback>
+          <p:sp>
+            <p:nvSpPr>
+              <p:cNvPr id="5" name="Abgerundetes Rechteck 4"/>
+              <p:cNvSpPr>
+                <a:spLocks noRot="1" noChangeAspect="1" noMove="1" noResize="1" noEditPoints="1" noAdjustHandles="1" noChangeArrowheads="1" noChangeShapeType="1" noTextEdit="1"/>
+              </p:cNvSpPr>
+              <p:nvPr/>
+            </p:nvSpPr>
+            <p:spPr>
+              <a:xfrm>
+                <a:off x="2433233" y="1379349"/>
+                <a:ext cx="712919" cy="3600000"/>
+              </a:xfrm>
+              <a:prstGeom prst="roundRect">
+                <a:avLst/>
+              </a:prstGeom>
+              <a:blipFill>
+                <a:blip r:embed="rId2"/>
+                <a:stretch>
+                  <a:fillRect/>
+                </a:stretch>
+              </a:blipFill>
+              <a:ln>
+                <a:solidFill>
+                  <a:schemeClr val="accent1">
+                    <a:lumMod val="50000"/>
+                  </a:schemeClr>
+                </a:solidFill>
+              </a:ln>
+            </p:spPr>
+            <p:txBody>
+              <a:bodyPr/>
+              <a:lstStyle/>
+              <a:p>
+                <a:r>
+                  <a:rPr lang="de-DE">
+                    <a:noFill/>
+                  </a:rPr>
+                  <a:t> </a:t>
+                </a:r>
+              </a:p>
+            </p:txBody>
+          </p:sp>
+        </mc:Fallback>
+      </mc:AlternateContent>
+      <mc:AlternateContent xmlns:mc="http://schemas.openxmlformats.org/markup-compatibility/2006">
+        <mc:Choice xmlns:a14="http://schemas.microsoft.com/office/drawing/2010/main" Requires="a14">
+          <p:sp>
+            <p:nvSpPr>
+              <p:cNvPr id="6" name="Abgerundetes Rechteck 5"/>
+              <p:cNvSpPr/>
+              <p:nvPr/>
+            </p:nvSpPr>
+            <p:spPr>
+              <a:xfrm>
+                <a:off x="9053702" y="654803"/>
+                <a:ext cx="588935" cy="1449092"/>
+              </a:xfrm>
+              <a:prstGeom prst="roundRect">
+                <a:avLst/>
+              </a:prstGeom>
+              <a:solidFill>
+                <a:schemeClr val="accent2"/>
+              </a:solidFill>
+              <a:ln>
+                <a:solidFill>
+                  <a:schemeClr val="accent1">
+                    <a:lumMod val="50000"/>
+                  </a:schemeClr>
+                </a:solidFill>
+              </a:ln>
+            </p:spPr>
+            <p:style>
+              <a:lnRef idx="2">
+                <a:schemeClr val="accent1">
+                  <a:shade val="50000"/>
+                </a:schemeClr>
+              </a:lnRef>
+              <a:fillRef idx="1">
+                <a:schemeClr val="accent1"/>
+              </a:fillRef>
+              <a:effectRef idx="0">
+                <a:schemeClr val="accent1"/>
+              </a:effectRef>
+              <a:fontRef idx="minor">
+                <a:schemeClr val="lt1"/>
+              </a:fontRef>
+            </p:style>
+            <p:txBody>
+              <a:bodyPr rtlCol="0" anchor="ctr"/>
+              <a:lstStyle/>
+              <a:p>
+                <a:pPr algn="ctr"/>
+                <a14:m>
+                  <m:oMathPara xmlns:m="http://schemas.openxmlformats.org/officeDocument/2006/math">
+                    <m:oMathParaPr>
+                      <m:jc m:val="centerGroup"/>
+                    </m:oMathParaPr>
+                    <m:oMath xmlns:m="http://schemas.openxmlformats.org/officeDocument/2006/math">
+                      <m:sSubSup>
+                        <m:sSubSupPr>
+                          <m:ctrlPr>
+                            <a:rPr lang="de-DE" b="0" i="1" smtClean="0">
+                              <a:latin typeface="Cambria Math" panose="02040503050406030204" pitchFamily="18" charset="0"/>
+                            </a:rPr>
+                          </m:ctrlPr>
+                        </m:sSubSupPr>
+                        <m:e>
+                          <m:r>
+                            <a:rPr lang="de-DE" b="0" i="1" smtClean="0">
+                              <a:latin typeface="Cambria Math" panose="02040503050406030204" pitchFamily="18" charset="0"/>
+                            </a:rPr>
+                            <m:t>𝑊</m:t>
+                          </m:r>
+                        </m:e>
+                        <m:sub>
+                          <m:r>
+                            <a:rPr lang="de-DE" b="0" i="1" smtClean="0">
+                              <a:latin typeface="Cambria Math" panose="02040503050406030204" pitchFamily="18" charset="0"/>
+                            </a:rPr>
+                            <m:t>𝑜𝑢𝑡</m:t>
+                          </m:r>
+                        </m:sub>
+                        <m:sup>
+                          <m:sSub>
+                            <m:sSubPr>
+                              <m:ctrlPr>
+                                <a:rPr lang="de-DE" b="0" i="1" smtClean="0">
+                                  <a:latin typeface="Cambria Math" panose="02040503050406030204" pitchFamily="18" charset="0"/>
+                                </a:rPr>
+                              </m:ctrlPr>
+                            </m:sSubPr>
+                            <m:e>
+                              <m:r>
+                                <a:rPr lang="de-DE" b="0" i="1" smtClean="0">
+                                  <a:latin typeface="Cambria Math" panose="02040503050406030204" pitchFamily="18" charset="0"/>
+                                </a:rPr>
+                                <m:t>𝑢</m:t>
+                              </m:r>
+                            </m:e>
+                            <m:sub>
+                              <m:r>
+                                <a:rPr lang="de-DE" b="0" i="1" smtClean="0">
+                                  <a:latin typeface="Cambria Math" panose="02040503050406030204" pitchFamily="18" charset="0"/>
+                                </a:rPr>
+                                <m:t>1</m:t>
+                              </m:r>
+                            </m:sub>
+                          </m:sSub>
+                        </m:sup>
+                      </m:sSubSup>
+                    </m:oMath>
+                  </m:oMathPara>
+                </a14:m>
+                <a:endParaRPr lang="de-DE" dirty="0"/>
+              </a:p>
+              <a:p>
+                <a:pPr algn="ctr"/>
+                <a:endParaRPr lang="de-DE" dirty="0" smtClean="0"/>
+              </a:p>
+            </p:txBody>
+          </p:sp>
+        </mc:Choice>
+        <mc:Fallback>
+          <p:sp>
+            <p:nvSpPr>
+              <p:cNvPr id="6" name="Abgerundetes Rechteck 5"/>
+              <p:cNvSpPr>
+                <a:spLocks noRot="1" noChangeAspect="1" noMove="1" noResize="1" noEditPoints="1" noAdjustHandles="1" noChangeArrowheads="1" noChangeShapeType="1" noTextEdit="1"/>
+              </p:cNvSpPr>
+              <p:nvPr/>
+            </p:nvSpPr>
+            <p:spPr>
+              <a:xfrm>
+                <a:off x="9053702" y="654803"/>
+                <a:ext cx="588935" cy="1449092"/>
+              </a:xfrm>
+              <a:prstGeom prst="roundRect">
+                <a:avLst/>
+              </a:prstGeom>
+              <a:blipFill>
+                <a:blip r:embed="rId3"/>
+                <a:stretch>
+                  <a:fillRect l="-6061"/>
+                </a:stretch>
+              </a:blipFill>
+              <a:ln>
+                <a:solidFill>
+                  <a:schemeClr val="accent1">
+                    <a:lumMod val="50000"/>
+                  </a:schemeClr>
+                </a:solidFill>
+              </a:ln>
+            </p:spPr>
+            <p:txBody>
+              <a:bodyPr/>
+              <a:lstStyle/>
+              <a:p>
+                <a:r>
+                  <a:rPr lang="de-DE">
+                    <a:noFill/>
+                  </a:rPr>
+                  <a:t> </a:t>
+                </a:r>
+              </a:p>
+            </p:txBody>
+          </p:sp>
+        </mc:Fallback>
+      </mc:AlternateContent>
+      <mc:AlternateContent xmlns:mc="http://schemas.openxmlformats.org/markup-compatibility/2006">
+        <mc:Choice xmlns:a14="http://schemas.microsoft.com/office/drawing/2010/main" Requires="a14">
+          <p:sp>
+            <p:nvSpPr>
+              <p:cNvPr id="7" name="Abgerundetes Rechteck 6"/>
+              <p:cNvSpPr/>
+              <p:nvPr/>
+            </p:nvSpPr>
+            <p:spPr>
+              <a:xfrm>
+                <a:off x="9053703" y="2454803"/>
+                <a:ext cx="588935" cy="1449092"/>
+              </a:xfrm>
+              <a:prstGeom prst="roundRect">
+                <a:avLst/>
+              </a:prstGeom>
+              <a:solidFill>
+                <a:schemeClr val="accent6"/>
+              </a:solidFill>
+              <a:ln>
+                <a:solidFill>
+                  <a:schemeClr val="accent1">
+                    <a:lumMod val="50000"/>
+                  </a:schemeClr>
+                </a:solidFill>
+              </a:ln>
+            </p:spPr>
+            <p:style>
+              <a:lnRef idx="2">
+                <a:schemeClr val="accent1">
+                  <a:shade val="50000"/>
+                </a:schemeClr>
+              </a:lnRef>
+              <a:fillRef idx="1">
+                <a:schemeClr val="accent1"/>
+              </a:fillRef>
+              <a:effectRef idx="0">
+                <a:schemeClr val="accent1"/>
+              </a:effectRef>
+              <a:fontRef idx="minor">
+                <a:schemeClr val="lt1"/>
+              </a:fontRef>
+            </p:style>
+            <p:txBody>
+              <a:bodyPr rtlCol="0" anchor="ctr"/>
+              <a:lstStyle/>
+              <a:p>
+                <a:pPr algn="ctr"/>
+                <a14:m>
+                  <m:oMathPara xmlns:m="http://schemas.openxmlformats.org/officeDocument/2006/math">
+                    <m:oMathParaPr>
+                      <m:jc m:val="centerGroup"/>
+                    </m:oMathParaPr>
+                    <m:oMath xmlns:m="http://schemas.openxmlformats.org/officeDocument/2006/math">
+                      <m:sSubSup>
+                        <m:sSubSupPr>
+                          <m:ctrlPr>
+                            <a:rPr lang="de-DE" i="1" smtClean="0">
+                              <a:latin typeface="Cambria Math" panose="02040503050406030204" pitchFamily="18" charset="0"/>
+                            </a:rPr>
+                          </m:ctrlPr>
+                        </m:sSubSupPr>
+                        <m:e>
+                          <m:r>
+                            <a:rPr lang="de-DE" i="1">
+                              <a:latin typeface="Cambria Math" panose="02040503050406030204" pitchFamily="18" charset="0"/>
+                            </a:rPr>
+                            <m:t>𝑊</m:t>
+                          </m:r>
+                        </m:e>
+                        <m:sub>
+                          <m:r>
+                            <a:rPr lang="de-DE" i="1">
+                              <a:latin typeface="Cambria Math" panose="02040503050406030204" pitchFamily="18" charset="0"/>
+                            </a:rPr>
+                            <m:t>𝑜𝑢𝑡</m:t>
+                          </m:r>
+                        </m:sub>
+                        <m:sup>
+                          <m:sSub>
+                            <m:sSubPr>
+                              <m:ctrlPr>
+                                <a:rPr lang="de-DE" i="1">
+                                  <a:latin typeface="Cambria Math" panose="02040503050406030204" pitchFamily="18" charset="0"/>
+                                </a:rPr>
+                              </m:ctrlPr>
+                            </m:sSubPr>
+                            <m:e>
+                              <m:r>
+                                <a:rPr lang="de-DE" i="1">
+                                  <a:latin typeface="Cambria Math" panose="02040503050406030204" pitchFamily="18" charset="0"/>
+                                </a:rPr>
+                                <m:t>𝑢</m:t>
+                              </m:r>
+                            </m:e>
+                            <m:sub>
+                              <m:r>
+                                <a:rPr lang="de-DE" b="0" i="1" smtClean="0">
+                                  <a:latin typeface="Cambria Math" panose="02040503050406030204" pitchFamily="18" charset="0"/>
+                                </a:rPr>
+                                <m:t>2</m:t>
+                              </m:r>
+                            </m:sub>
+                          </m:sSub>
+                        </m:sup>
+                      </m:sSubSup>
+                    </m:oMath>
+                  </m:oMathPara>
+                </a14:m>
+                <a:endParaRPr lang="de-DE" dirty="0"/>
+              </a:p>
+            </p:txBody>
+          </p:sp>
+        </mc:Choice>
+        <mc:Fallback>
+          <p:sp>
+            <p:nvSpPr>
+              <p:cNvPr id="7" name="Abgerundetes Rechteck 6"/>
+              <p:cNvSpPr>
+                <a:spLocks noRot="1" noChangeAspect="1" noMove="1" noResize="1" noEditPoints="1" noAdjustHandles="1" noChangeArrowheads="1" noChangeShapeType="1" noTextEdit="1"/>
+              </p:cNvSpPr>
+              <p:nvPr/>
+            </p:nvSpPr>
+            <p:spPr>
+              <a:xfrm>
+                <a:off x="9053703" y="2454803"/>
+                <a:ext cx="588935" cy="1449092"/>
+              </a:xfrm>
+              <a:prstGeom prst="roundRect">
+                <a:avLst/>
+              </a:prstGeom>
+              <a:blipFill>
+                <a:blip r:embed="rId4"/>
+                <a:stretch>
+                  <a:fillRect l="-6061"/>
+                </a:stretch>
+              </a:blipFill>
+              <a:ln>
+                <a:solidFill>
+                  <a:schemeClr val="accent1">
+                    <a:lumMod val="50000"/>
+                  </a:schemeClr>
+                </a:solidFill>
+              </a:ln>
+            </p:spPr>
+            <p:txBody>
+              <a:bodyPr/>
+              <a:lstStyle/>
+              <a:p>
+                <a:r>
+                  <a:rPr lang="de-DE">
+                    <a:noFill/>
+                  </a:rPr>
+                  <a:t> </a:t>
+                </a:r>
+              </a:p>
+            </p:txBody>
+          </p:sp>
+        </mc:Fallback>
+      </mc:AlternateContent>
+      <mc:AlternateContent xmlns:mc="http://schemas.openxmlformats.org/markup-compatibility/2006">
+        <mc:Choice xmlns:a14="http://schemas.microsoft.com/office/drawing/2010/main" Requires="a14">
+          <p:sp>
+            <p:nvSpPr>
+              <p:cNvPr id="8" name="Abgerundetes Rechteck 7"/>
+              <p:cNvSpPr/>
+              <p:nvPr/>
+            </p:nvSpPr>
+            <p:spPr>
+              <a:xfrm>
+                <a:off x="9053701" y="4262710"/>
+                <a:ext cx="588935" cy="1449092"/>
+              </a:xfrm>
+              <a:prstGeom prst="roundRect">
+                <a:avLst/>
+              </a:prstGeom>
+              <a:solidFill>
+                <a:schemeClr val="accent5"/>
+              </a:solidFill>
+              <a:ln>
+                <a:solidFill>
+                  <a:schemeClr val="accent1">
+                    <a:lumMod val="50000"/>
+                  </a:schemeClr>
+                </a:solidFill>
+              </a:ln>
+            </p:spPr>
+            <p:style>
+              <a:lnRef idx="2">
+                <a:schemeClr val="accent1">
+                  <a:shade val="50000"/>
+                </a:schemeClr>
+              </a:lnRef>
+              <a:fillRef idx="1">
+                <a:schemeClr val="accent1"/>
+              </a:fillRef>
+              <a:effectRef idx="0">
+                <a:schemeClr val="accent1"/>
+              </a:effectRef>
+              <a:fontRef idx="minor">
+                <a:schemeClr val="lt1"/>
+              </a:fontRef>
+            </p:style>
+            <p:txBody>
+              <a:bodyPr rtlCol="0" anchor="ctr"/>
+              <a:lstStyle/>
+              <a:p>
+                <a:pPr algn="ctr"/>
+                <a14:m>
+                  <m:oMathPara xmlns:m="http://schemas.openxmlformats.org/officeDocument/2006/math">
+                    <m:oMathParaPr>
+                      <m:jc m:val="centerGroup"/>
+                    </m:oMathParaPr>
+                    <m:oMath xmlns:m="http://schemas.openxmlformats.org/officeDocument/2006/math">
+                      <m:sSubSup>
+                        <m:sSubSupPr>
+                          <m:ctrlPr>
+                            <a:rPr lang="de-DE" i="1" smtClean="0">
+                              <a:latin typeface="Cambria Math" panose="02040503050406030204" pitchFamily="18" charset="0"/>
+                            </a:rPr>
+                          </m:ctrlPr>
+                        </m:sSubSupPr>
+                        <m:e>
+                          <m:r>
+                            <a:rPr lang="de-DE" i="1">
+                              <a:latin typeface="Cambria Math" panose="02040503050406030204" pitchFamily="18" charset="0"/>
+                            </a:rPr>
+                            <m:t>𝑊</m:t>
+                          </m:r>
+                        </m:e>
+                        <m:sub>
+                          <m:r>
+                            <a:rPr lang="de-DE" i="1">
+                              <a:latin typeface="Cambria Math" panose="02040503050406030204" pitchFamily="18" charset="0"/>
+                            </a:rPr>
+                            <m:t>𝑜𝑢𝑡</m:t>
+                          </m:r>
+                        </m:sub>
+                        <m:sup>
+                          <m:sSub>
+                            <m:sSubPr>
+                              <m:ctrlPr>
+                                <a:rPr lang="de-DE" i="1">
+                                  <a:latin typeface="Cambria Math" panose="02040503050406030204" pitchFamily="18" charset="0"/>
+                                </a:rPr>
+                              </m:ctrlPr>
+                            </m:sSubPr>
+                            <m:e>
+                              <m:r>
+                                <a:rPr lang="de-DE" i="1">
+                                  <a:latin typeface="Cambria Math" panose="02040503050406030204" pitchFamily="18" charset="0"/>
+                                </a:rPr>
+                                <m:t>𝑢</m:t>
+                              </m:r>
+                            </m:e>
+                            <m:sub>
+                              <m:r>
+                                <a:rPr lang="de-DE" b="0" i="1" smtClean="0">
+                                  <a:latin typeface="Cambria Math" panose="02040503050406030204" pitchFamily="18" charset="0"/>
+                                </a:rPr>
+                                <m:t>3</m:t>
+                              </m:r>
+                            </m:sub>
+                          </m:sSub>
+                        </m:sup>
+                      </m:sSubSup>
+                    </m:oMath>
+                  </m:oMathPara>
+                </a14:m>
+                <a:endParaRPr lang="de-DE" dirty="0"/>
+              </a:p>
+            </p:txBody>
+          </p:sp>
+        </mc:Choice>
+        <mc:Fallback>
+          <p:sp>
+            <p:nvSpPr>
+              <p:cNvPr id="8" name="Abgerundetes Rechteck 7"/>
+              <p:cNvSpPr>
+                <a:spLocks noRot="1" noChangeAspect="1" noMove="1" noResize="1" noEditPoints="1" noAdjustHandles="1" noChangeArrowheads="1" noChangeShapeType="1" noTextEdit="1"/>
+              </p:cNvSpPr>
+              <p:nvPr/>
+            </p:nvSpPr>
+            <p:spPr>
+              <a:xfrm>
+                <a:off x="9053701" y="4262710"/>
+                <a:ext cx="588935" cy="1449092"/>
+              </a:xfrm>
+              <a:prstGeom prst="roundRect">
+                <a:avLst/>
+              </a:prstGeom>
+              <a:blipFill>
+                <a:blip r:embed="rId5"/>
+                <a:stretch>
+                  <a:fillRect l="-6061"/>
+                </a:stretch>
+              </a:blipFill>
+              <a:ln>
+                <a:solidFill>
+                  <a:schemeClr val="accent1">
+                    <a:lumMod val="50000"/>
+                  </a:schemeClr>
+                </a:solidFill>
+              </a:ln>
+            </p:spPr>
+            <p:txBody>
+              <a:bodyPr/>
+              <a:lstStyle/>
+              <a:p>
+                <a:r>
+                  <a:rPr lang="de-DE">
+                    <a:noFill/>
+                  </a:rPr>
+                  <a:t> </a:t>
+                </a:r>
+              </a:p>
+            </p:txBody>
+          </p:sp>
+        </mc:Fallback>
+      </mc:AlternateContent>
+      <p:cxnSp>
+        <p:nvCxnSpPr>
+          <p:cNvPr id="12" name="Gewinkelter Verbinder 11"/>
+          <p:cNvCxnSpPr>
+            <a:stCxn id="6" idx="3"/>
+            <a:endCxn id="5" idx="1"/>
+          </p:cNvCxnSpPr>
+          <p:nvPr/>
+        </p:nvCxnSpPr>
+        <p:spPr>
+          <a:xfrm flipH="1">
+            <a:off x="2433233" y="1379349"/>
+            <a:ext cx="7209404" cy="1800000"/>
+          </a:xfrm>
+          <a:prstGeom prst="bentConnector5">
+            <a:avLst>
+              <a:gd name="adj1" fmla="val -9651"/>
+              <a:gd name="adj2" fmla="val 269574"/>
+              <a:gd name="adj3" fmla="val 112407"/>
+            </a:avLst>
+          </a:prstGeom>
+          <a:ln w="38100">
+            <a:solidFill>
+              <a:schemeClr val="accent1">
+                <a:lumMod val="50000"/>
+              </a:schemeClr>
+            </a:solidFill>
+            <a:tailEnd type="triangle"/>
+          </a:ln>
+        </p:spPr>
+        <p:style>
+          <a:lnRef idx="1">
+            <a:schemeClr val="accent1"/>
+          </a:lnRef>
+          <a:fillRef idx="0">
+            <a:schemeClr val="accent1"/>
+          </a:fillRef>
+          <a:effectRef idx="0">
+            <a:schemeClr val="accent1"/>
+          </a:effectRef>
+          <a:fontRef idx="minor">
+            <a:schemeClr val="tx1"/>
+          </a:fontRef>
+        </p:style>
+      </p:cxnSp>
+      <p:cxnSp>
+        <p:nvCxnSpPr>
+          <p:cNvPr id="14" name="Gewinkelter Verbinder 13"/>
+          <p:cNvCxnSpPr>
+            <a:stCxn id="7" idx="3"/>
+            <a:endCxn id="5" idx="1"/>
+          </p:cNvCxnSpPr>
+          <p:nvPr/>
+        </p:nvCxnSpPr>
+        <p:spPr>
+          <a:xfrm flipH="1">
+            <a:off x="2433233" y="3179349"/>
+            <a:ext cx="7209405" cy="12700"/>
+          </a:xfrm>
+          <a:prstGeom prst="bentConnector5">
+            <a:avLst>
+              <a:gd name="adj1" fmla="val -9650"/>
+              <a:gd name="adj2" fmla="val 24034102"/>
+              <a:gd name="adj3" fmla="val 112407"/>
+            </a:avLst>
+          </a:prstGeom>
+          <a:ln w="38100">
+            <a:solidFill>
+              <a:schemeClr val="accent1">
+                <a:lumMod val="50000"/>
+              </a:schemeClr>
+            </a:solidFill>
+            <a:tailEnd type="triangle"/>
+          </a:ln>
+        </p:spPr>
+        <p:style>
+          <a:lnRef idx="1">
+            <a:schemeClr val="accent1"/>
+          </a:lnRef>
+          <a:fillRef idx="0">
+            <a:schemeClr val="accent1"/>
+          </a:fillRef>
+          <a:effectRef idx="0">
+            <a:schemeClr val="accent1"/>
+          </a:effectRef>
+          <a:fontRef idx="minor">
+            <a:schemeClr val="tx1"/>
+          </a:fontRef>
+        </p:style>
+      </p:cxnSp>
+      <p:cxnSp>
+        <p:nvCxnSpPr>
+          <p:cNvPr id="16" name="Gewinkelter Verbinder 15"/>
+          <p:cNvCxnSpPr>
+            <a:stCxn id="8" idx="3"/>
+            <a:endCxn id="5" idx="1"/>
+          </p:cNvCxnSpPr>
+          <p:nvPr/>
+        </p:nvCxnSpPr>
+        <p:spPr>
+          <a:xfrm flipH="1" flipV="1">
+            <a:off x="2433233" y="3179349"/>
+            <a:ext cx="7209403" cy="1807907"/>
+          </a:xfrm>
+          <a:prstGeom prst="bentConnector5">
+            <a:avLst>
+              <a:gd name="adj1" fmla="val -9650"/>
+              <a:gd name="adj2" fmla="val -69269"/>
+              <a:gd name="adj3" fmla="val 112408"/>
+            </a:avLst>
+          </a:prstGeom>
+          <a:ln w="38100">
+            <a:solidFill>
+              <a:schemeClr val="accent1">
+                <a:lumMod val="50000"/>
+              </a:schemeClr>
+            </a:solidFill>
+            <a:tailEnd type="triangle"/>
+          </a:ln>
+        </p:spPr>
+        <p:style>
+          <a:lnRef idx="1">
+            <a:schemeClr val="accent1"/>
+          </a:lnRef>
+          <a:fillRef idx="0">
+            <a:schemeClr val="accent1"/>
+          </a:fillRef>
+          <a:effectRef idx="0">
+            <a:schemeClr val="accent1"/>
+          </a:effectRef>
+          <a:fontRef idx="minor">
+            <a:schemeClr val="tx1"/>
+          </a:fontRef>
+        </p:style>
+      </p:cxnSp>
+      <p:cxnSp>
+        <p:nvCxnSpPr>
+          <p:cNvPr id="31" name="Gerade Verbindung mit Pfeil 30"/>
+          <p:cNvCxnSpPr>
+            <a:stCxn id="5" idx="3"/>
+            <a:endCxn id="4" idx="2"/>
+          </p:cNvCxnSpPr>
+          <p:nvPr/>
+        </p:nvCxnSpPr>
+        <p:spPr>
+          <a:xfrm>
+            <a:off x="3146152" y="3179349"/>
+            <a:ext cx="960898" cy="0"/>
+          </a:xfrm>
+          <a:prstGeom prst="straightConnector1">
+            <a:avLst/>
+          </a:prstGeom>
+          <a:ln w="38100">
+            <a:solidFill>
+              <a:schemeClr val="accent1">
+                <a:lumMod val="50000"/>
+              </a:schemeClr>
+            </a:solidFill>
+            <a:tailEnd type="triangle"/>
+          </a:ln>
+        </p:spPr>
+        <p:style>
+          <a:lnRef idx="1">
+            <a:schemeClr val="accent1"/>
+          </a:lnRef>
+          <a:fillRef idx="0">
+            <a:schemeClr val="accent1"/>
+          </a:fillRef>
+          <a:effectRef idx="0">
+            <a:schemeClr val="accent1"/>
+          </a:effectRef>
+          <a:fontRef idx="minor">
+            <a:schemeClr val="tx1"/>
+          </a:fontRef>
+        </p:style>
+      </p:cxnSp>
+      <p:cxnSp>
+        <p:nvCxnSpPr>
+          <p:cNvPr id="33" name="Gerade Verbindung mit Pfeil 32"/>
+          <p:cNvCxnSpPr>
+            <a:stCxn id="4" idx="6"/>
+            <a:endCxn id="6" idx="1"/>
+          </p:cNvCxnSpPr>
+          <p:nvPr/>
+        </p:nvCxnSpPr>
+        <p:spPr>
+          <a:xfrm flipV="1">
+            <a:off x="7707050" y="1379349"/>
+            <a:ext cx="1346652" cy="1800000"/>
+          </a:xfrm>
+          <a:prstGeom prst="straightConnector1">
+            <a:avLst/>
+          </a:prstGeom>
+          <a:ln w="38100">
+            <a:solidFill>
+              <a:schemeClr val="accent1">
+                <a:lumMod val="50000"/>
+              </a:schemeClr>
+            </a:solidFill>
+            <a:tailEnd type="triangle"/>
+          </a:ln>
+        </p:spPr>
+        <p:style>
+          <a:lnRef idx="1">
+            <a:schemeClr val="accent1"/>
+          </a:lnRef>
+          <a:fillRef idx="0">
+            <a:schemeClr val="accent1"/>
+          </a:fillRef>
+          <a:effectRef idx="0">
+            <a:schemeClr val="accent1"/>
+          </a:effectRef>
+          <a:fontRef idx="minor">
+            <a:schemeClr val="tx1"/>
+          </a:fontRef>
+        </p:style>
+      </p:cxnSp>
+      <p:cxnSp>
+        <p:nvCxnSpPr>
+          <p:cNvPr id="35" name="Gerade Verbindung mit Pfeil 34"/>
+          <p:cNvCxnSpPr>
+            <a:stCxn id="4" idx="6"/>
+            <a:endCxn id="7" idx="1"/>
+          </p:cNvCxnSpPr>
+          <p:nvPr/>
+        </p:nvCxnSpPr>
+        <p:spPr>
+          <a:xfrm>
+            <a:off x="7707050" y="3179349"/>
+            <a:ext cx="1346653" cy="0"/>
+          </a:xfrm>
+          <a:prstGeom prst="straightConnector1">
+            <a:avLst/>
+          </a:prstGeom>
+          <a:ln w="38100">
+            <a:solidFill>
+              <a:schemeClr val="accent1">
+                <a:lumMod val="50000"/>
+              </a:schemeClr>
+            </a:solidFill>
+            <a:tailEnd type="triangle"/>
+          </a:ln>
+        </p:spPr>
+        <p:style>
+          <a:lnRef idx="1">
+            <a:schemeClr val="accent1"/>
+          </a:lnRef>
+          <a:fillRef idx="0">
+            <a:schemeClr val="accent1"/>
+          </a:fillRef>
+          <a:effectRef idx="0">
+            <a:schemeClr val="accent1"/>
+          </a:effectRef>
+          <a:fontRef idx="minor">
+            <a:schemeClr val="tx1"/>
+          </a:fontRef>
+        </p:style>
+      </p:cxnSp>
+      <p:cxnSp>
+        <p:nvCxnSpPr>
+          <p:cNvPr id="37" name="Gerade Verbindung mit Pfeil 36"/>
+          <p:cNvCxnSpPr>
+            <a:stCxn id="4" idx="6"/>
+            <a:endCxn id="8" idx="1"/>
+          </p:cNvCxnSpPr>
+          <p:nvPr/>
+        </p:nvCxnSpPr>
+        <p:spPr>
+          <a:xfrm>
+            <a:off x="7707050" y="3179349"/>
+            <a:ext cx="1346651" cy="1807907"/>
+          </a:xfrm>
+          <a:prstGeom prst="straightConnector1">
+            <a:avLst/>
+          </a:prstGeom>
+          <a:ln w="38100">
+            <a:solidFill>
+              <a:schemeClr val="accent1">
+                <a:lumMod val="50000"/>
+              </a:schemeClr>
+            </a:solidFill>
+            <a:tailEnd type="triangle"/>
+          </a:ln>
+        </p:spPr>
+        <p:style>
+          <a:lnRef idx="1">
+            <a:schemeClr val="accent1"/>
+          </a:lnRef>
+          <a:fillRef idx="0">
+            <a:schemeClr val="accent1"/>
+          </a:fillRef>
+          <a:effectRef idx="0">
+            <a:schemeClr val="accent1"/>
+          </a:effectRef>
+          <a:fontRef idx="minor">
+            <a:schemeClr val="tx1"/>
+          </a:fontRef>
+        </p:style>
+      </p:cxnSp>
+      <p:sp>
+        <p:nvSpPr>
+          <p:cNvPr id="55" name="Ellipse 54"/>
+          <p:cNvSpPr/>
+          <p:nvPr/>
+        </p:nvSpPr>
+        <p:spPr>
+          <a:xfrm>
+            <a:off x="4619625" y="2603639"/>
+            <a:ext cx="252000" cy="252000"/>
+          </a:xfrm>
+          <a:prstGeom prst="ellipse">
+            <a:avLst/>
+          </a:prstGeom>
+          <a:solidFill>
+            <a:schemeClr val="accent3">
+              <a:lumMod val="50000"/>
+            </a:schemeClr>
+          </a:solidFill>
+          <a:ln>
+            <a:solidFill>
+              <a:schemeClr val="accent1">
+                <a:lumMod val="50000"/>
+              </a:schemeClr>
+            </a:solidFill>
+          </a:ln>
+        </p:spPr>
+        <p:style>
+          <a:lnRef idx="2">
+            <a:schemeClr val="accent1">
+              <a:shade val="50000"/>
+            </a:schemeClr>
+          </a:lnRef>
+          <a:fillRef idx="1">
+            <a:schemeClr val="accent1"/>
+          </a:fillRef>
+          <a:effectRef idx="0">
+            <a:schemeClr val="accent1"/>
+          </a:effectRef>
+          <a:fontRef idx="minor">
+            <a:schemeClr val="lt1"/>
+          </a:fontRef>
+        </p:style>
+        <p:txBody>
+          <a:bodyPr rtlCol="0" anchor="ctr"/>
+          <a:lstStyle/>
+          <a:p>
+            <a:pPr algn="ctr"/>
+            <a:endParaRPr lang="de-DE" dirty="0"/>
+          </a:p>
+        </p:txBody>
+      </p:sp>
+      <p:sp>
+        <p:nvSpPr>
+          <p:cNvPr id="56" name="Ellipse 55"/>
+          <p:cNvSpPr/>
+          <p:nvPr/>
+        </p:nvSpPr>
+        <p:spPr>
+          <a:xfrm>
+            <a:off x="5398377" y="1898390"/>
+            <a:ext cx="252000" cy="252000"/>
+          </a:xfrm>
+          <a:prstGeom prst="ellipse">
+            <a:avLst/>
+          </a:prstGeom>
+          <a:solidFill>
+            <a:schemeClr val="accent3">
+              <a:lumMod val="50000"/>
+            </a:schemeClr>
+          </a:solidFill>
+          <a:ln>
+            <a:solidFill>
+              <a:schemeClr val="accent1">
+                <a:lumMod val="50000"/>
+              </a:schemeClr>
+            </a:solidFill>
+          </a:ln>
+        </p:spPr>
+        <p:style>
+          <a:lnRef idx="2">
+            <a:schemeClr val="accent1">
+              <a:shade val="50000"/>
+            </a:schemeClr>
+          </a:lnRef>
+          <a:fillRef idx="1">
+            <a:schemeClr val="accent1"/>
+          </a:fillRef>
+          <a:effectRef idx="0">
+            <a:schemeClr val="accent1"/>
+          </a:effectRef>
+          <a:fontRef idx="minor">
+            <a:schemeClr val="lt1"/>
+          </a:fontRef>
+        </p:style>
+        <p:txBody>
+          <a:bodyPr rtlCol="0" anchor="ctr"/>
+          <a:lstStyle/>
+          <a:p>
+            <a:pPr algn="ctr"/>
+            <a:endParaRPr lang="de-DE" dirty="0"/>
+          </a:p>
+        </p:txBody>
+      </p:sp>
+      <p:sp>
+        <p:nvSpPr>
+          <p:cNvPr id="57" name="Ellipse 56"/>
+          <p:cNvSpPr/>
+          <p:nvPr/>
+        </p:nvSpPr>
+        <p:spPr>
+          <a:xfrm>
+            <a:off x="5911337" y="2670194"/>
+            <a:ext cx="252000" cy="252000"/>
+          </a:xfrm>
+          <a:prstGeom prst="ellipse">
+            <a:avLst/>
+          </a:prstGeom>
+          <a:solidFill>
+            <a:schemeClr val="accent3">
+              <a:lumMod val="50000"/>
+            </a:schemeClr>
+          </a:solidFill>
+          <a:ln>
+            <a:solidFill>
+              <a:schemeClr val="accent1">
+                <a:lumMod val="50000"/>
+              </a:schemeClr>
+            </a:solidFill>
+          </a:ln>
+        </p:spPr>
+        <p:style>
+          <a:lnRef idx="2">
+            <a:schemeClr val="accent1">
+              <a:shade val="50000"/>
+            </a:schemeClr>
+          </a:lnRef>
+          <a:fillRef idx="1">
+            <a:schemeClr val="accent1"/>
+          </a:fillRef>
+          <a:effectRef idx="0">
+            <a:schemeClr val="accent1"/>
+          </a:effectRef>
+          <a:fontRef idx="minor">
+            <a:schemeClr val="lt1"/>
+          </a:fontRef>
+        </p:style>
+        <p:txBody>
+          <a:bodyPr rtlCol="0" anchor="ctr"/>
+          <a:lstStyle/>
+          <a:p>
+            <a:pPr algn="ctr"/>
+            <a:endParaRPr lang="de-DE" dirty="0"/>
+          </a:p>
+        </p:txBody>
+      </p:sp>
+      <p:sp>
+        <p:nvSpPr>
+          <p:cNvPr id="58" name="Ellipse 57"/>
+          <p:cNvSpPr/>
+          <p:nvPr/>
+        </p:nvSpPr>
+        <p:spPr>
+          <a:xfrm>
+            <a:off x="4650375" y="3777895"/>
+            <a:ext cx="252000" cy="252000"/>
+          </a:xfrm>
+          <a:prstGeom prst="ellipse">
+            <a:avLst/>
+          </a:prstGeom>
+          <a:solidFill>
+            <a:schemeClr val="accent3">
+              <a:lumMod val="50000"/>
+            </a:schemeClr>
+          </a:solidFill>
+          <a:ln>
+            <a:solidFill>
+              <a:schemeClr val="accent1">
+                <a:lumMod val="50000"/>
+              </a:schemeClr>
+            </a:solidFill>
+          </a:ln>
+        </p:spPr>
+        <p:style>
+          <a:lnRef idx="2">
+            <a:schemeClr val="accent1">
+              <a:shade val="50000"/>
+            </a:schemeClr>
+          </a:lnRef>
+          <a:fillRef idx="1">
+            <a:schemeClr val="accent1"/>
+          </a:fillRef>
+          <a:effectRef idx="0">
+            <a:schemeClr val="accent1"/>
+          </a:effectRef>
+          <a:fontRef idx="minor">
+            <a:schemeClr val="lt1"/>
+          </a:fontRef>
+        </p:style>
+        <p:txBody>
+          <a:bodyPr rtlCol="0" anchor="ctr"/>
+          <a:lstStyle/>
+          <a:p>
+            <a:pPr algn="ctr"/>
+            <a:endParaRPr lang="de-DE" dirty="0"/>
+          </a:p>
+        </p:txBody>
+      </p:sp>
+      <p:sp>
+        <p:nvSpPr>
+          <p:cNvPr id="59" name="Ellipse 58"/>
+          <p:cNvSpPr/>
+          <p:nvPr/>
+        </p:nvSpPr>
+        <p:spPr>
+          <a:xfrm>
+            <a:off x="5619960" y="3301970"/>
+            <a:ext cx="252000" cy="252000"/>
+          </a:xfrm>
+          <a:prstGeom prst="ellipse">
+            <a:avLst/>
+          </a:prstGeom>
+          <a:solidFill>
+            <a:schemeClr val="accent3">
+              <a:lumMod val="50000"/>
+            </a:schemeClr>
+          </a:solidFill>
+          <a:ln>
+            <a:solidFill>
+              <a:schemeClr val="accent1">
+                <a:lumMod val="50000"/>
+              </a:schemeClr>
+            </a:solidFill>
+          </a:ln>
+        </p:spPr>
+        <p:style>
+          <a:lnRef idx="2">
+            <a:schemeClr val="accent1">
+              <a:shade val="50000"/>
+            </a:schemeClr>
+          </a:lnRef>
+          <a:fillRef idx="1">
+            <a:schemeClr val="accent1"/>
+          </a:fillRef>
+          <a:effectRef idx="0">
+            <a:schemeClr val="accent1"/>
+          </a:effectRef>
+          <a:fontRef idx="minor">
+            <a:schemeClr val="lt1"/>
+          </a:fontRef>
+        </p:style>
+        <p:txBody>
+          <a:bodyPr rtlCol="0" anchor="ctr"/>
+          <a:lstStyle/>
+          <a:p>
+            <a:pPr algn="ctr"/>
+            <a:endParaRPr lang="de-DE" dirty="0"/>
+          </a:p>
+        </p:txBody>
+      </p:sp>
+      <p:sp>
+        <p:nvSpPr>
+          <p:cNvPr id="60" name="Ellipse 59"/>
+          <p:cNvSpPr/>
+          <p:nvPr/>
+        </p:nvSpPr>
+        <p:spPr>
+          <a:xfrm>
+            <a:off x="5759366" y="4120871"/>
+            <a:ext cx="252000" cy="252000"/>
+          </a:xfrm>
+          <a:prstGeom prst="ellipse">
+            <a:avLst/>
+          </a:prstGeom>
+          <a:solidFill>
+            <a:schemeClr val="accent3">
+              <a:lumMod val="50000"/>
+            </a:schemeClr>
+          </a:solidFill>
+          <a:ln>
+            <a:solidFill>
+              <a:schemeClr val="accent1">
+                <a:lumMod val="50000"/>
+              </a:schemeClr>
+            </a:solidFill>
+          </a:ln>
+        </p:spPr>
+        <p:style>
+          <a:lnRef idx="2">
+            <a:schemeClr val="accent1">
+              <a:shade val="50000"/>
+            </a:schemeClr>
+          </a:lnRef>
+          <a:fillRef idx="1">
+            <a:schemeClr val="accent1"/>
+          </a:fillRef>
+          <a:effectRef idx="0">
+            <a:schemeClr val="accent1"/>
+          </a:effectRef>
+          <a:fontRef idx="minor">
+            <a:schemeClr val="lt1"/>
+          </a:fontRef>
+        </p:style>
+        <p:txBody>
+          <a:bodyPr rtlCol="0" anchor="ctr"/>
+          <a:lstStyle/>
+          <a:p>
+            <a:pPr algn="ctr"/>
+            <a:endParaRPr lang="de-DE" dirty="0"/>
+          </a:p>
+        </p:txBody>
+      </p:sp>
+      <p:sp>
+        <p:nvSpPr>
+          <p:cNvPr id="61" name="Ellipse 60"/>
+          <p:cNvSpPr/>
+          <p:nvPr/>
+        </p:nvSpPr>
+        <p:spPr>
+          <a:xfrm>
+            <a:off x="6274791" y="3312162"/>
+            <a:ext cx="252000" cy="252000"/>
+          </a:xfrm>
+          <a:prstGeom prst="ellipse">
+            <a:avLst/>
+          </a:prstGeom>
+          <a:solidFill>
+            <a:schemeClr val="accent3">
+              <a:lumMod val="50000"/>
+            </a:schemeClr>
+          </a:solidFill>
+          <a:ln>
+            <a:solidFill>
+              <a:schemeClr val="accent1">
+                <a:lumMod val="50000"/>
+              </a:schemeClr>
+            </a:solidFill>
+          </a:ln>
+        </p:spPr>
+        <p:style>
+          <a:lnRef idx="2">
+            <a:schemeClr val="accent1">
+              <a:shade val="50000"/>
+            </a:schemeClr>
+          </a:lnRef>
+          <a:fillRef idx="1">
+            <a:schemeClr val="accent1"/>
+          </a:fillRef>
+          <a:effectRef idx="0">
+            <a:schemeClr val="accent1"/>
+          </a:effectRef>
+          <a:fontRef idx="minor">
+            <a:schemeClr val="lt1"/>
+          </a:fontRef>
+        </p:style>
+        <p:txBody>
+          <a:bodyPr rtlCol="0" anchor="ctr"/>
+          <a:lstStyle/>
+          <a:p>
+            <a:pPr algn="ctr"/>
+            <a:endParaRPr lang="de-DE" dirty="0"/>
+          </a:p>
+        </p:txBody>
+      </p:sp>
+      <p:sp>
+        <p:nvSpPr>
+          <p:cNvPr id="62" name="Ellipse 61"/>
+          <p:cNvSpPr/>
+          <p:nvPr/>
+        </p:nvSpPr>
+        <p:spPr>
+          <a:xfrm>
+            <a:off x="6292758" y="1950803"/>
+            <a:ext cx="252000" cy="252000"/>
+          </a:xfrm>
+          <a:prstGeom prst="ellipse">
+            <a:avLst/>
+          </a:prstGeom>
+          <a:solidFill>
+            <a:schemeClr val="accent3">
+              <a:lumMod val="50000"/>
+            </a:schemeClr>
+          </a:solidFill>
+          <a:ln>
+            <a:solidFill>
+              <a:schemeClr val="accent1">
+                <a:lumMod val="50000"/>
+              </a:schemeClr>
+            </a:solidFill>
+          </a:ln>
+        </p:spPr>
+        <p:style>
+          <a:lnRef idx="2">
+            <a:schemeClr val="accent1">
+              <a:shade val="50000"/>
+            </a:schemeClr>
+          </a:lnRef>
+          <a:fillRef idx="1">
+            <a:schemeClr val="accent1"/>
+          </a:fillRef>
+          <a:effectRef idx="0">
+            <a:schemeClr val="accent1"/>
+          </a:effectRef>
+          <a:fontRef idx="minor">
+            <a:schemeClr val="lt1"/>
+          </a:fontRef>
+        </p:style>
+        <p:txBody>
+          <a:bodyPr rtlCol="0" anchor="ctr"/>
+          <a:lstStyle/>
+          <a:p>
+            <a:pPr algn="ctr"/>
+            <a:endParaRPr lang="de-DE" dirty="0"/>
+          </a:p>
+        </p:txBody>
+      </p:sp>
+      <p:sp>
+        <p:nvSpPr>
+          <p:cNvPr id="63" name="Ellipse 62"/>
+          <p:cNvSpPr/>
+          <p:nvPr/>
+        </p:nvSpPr>
+        <p:spPr>
+          <a:xfrm>
+            <a:off x="6824104" y="4047615"/>
+            <a:ext cx="252000" cy="252000"/>
+          </a:xfrm>
+          <a:prstGeom prst="ellipse">
+            <a:avLst/>
+          </a:prstGeom>
+          <a:solidFill>
+            <a:schemeClr val="accent3">
+              <a:lumMod val="50000"/>
+            </a:schemeClr>
+          </a:solidFill>
+          <a:ln>
+            <a:solidFill>
+              <a:schemeClr val="accent1">
+                <a:lumMod val="50000"/>
+              </a:schemeClr>
+            </a:solidFill>
+          </a:ln>
+        </p:spPr>
+        <p:style>
+          <a:lnRef idx="2">
+            <a:schemeClr val="accent1">
+              <a:shade val="50000"/>
+            </a:schemeClr>
+          </a:lnRef>
+          <a:fillRef idx="1">
+            <a:schemeClr val="accent1"/>
+          </a:fillRef>
+          <a:effectRef idx="0">
+            <a:schemeClr val="accent1"/>
+          </a:effectRef>
+          <a:fontRef idx="minor">
+            <a:schemeClr val="lt1"/>
+          </a:fontRef>
+        </p:style>
+        <p:txBody>
+          <a:bodyPr rtlCol="0" anchor="ctr"/>
+          <a:lstStyle/>
+          <a:p>
+            <a:pPr algn="ctr"/>
+            <a:endParaRPr lang="de-DE" dirty="0"/>
+          </a:p>
+        </p:txBody>
+      </p:sp>
+      <p:sp>
+        <p:nvSpPr>
+          <p:cNvPr id="64" name="Ellipse 63"/>
+          <p:cNvSpPr/>
+          <p:nvPr/>
+        </p:nvSpPr>
+        <p:spPr>
+          <a:xfrm>
+            <a:off x="6950104" y="2686256"/>
+            <a:ext cx="252000" cy="252000"/>
+          </a:xfrm>
+          <a:prstGeom prst="ellipse">
+            <a:avLst/>
+          </a:prstGeom>
+          <a:solidFill>
+            <a:schemeClr val="accent3">
+              <a:lumMod val="50000"/>
+            </a:schemeClr>
+          </a:solidFill>
+          <a:ln>
+            <a:solidFill>
+              <a:schemeClr val="accent1">
+                <a:lumMod val="50000"/>
+              </a:schemeClr>
+            </a:solidFill>
+          </a:ln>
+        </p:spPr>
+        <p:style>
+          <a:lnRef idx="2">
+            <a:schemeClr val="accent1">
+              <a:shade val="50000"/>
+            </a:schemeClr>
+          </a:lnRef>
+          <a:fillRef idx="1">
+            <a:schemeClr val="accent1"/>
+          </a:fillRef>
+          <a:effectRef idx="0">
+            <a:schemeClr val="accent1"/>
+          </a:effectRef>
+          <a:fontRef idx="minor">
+            <a:schemeClr val="lt1"/>
+          </a:fontRef>
+        </p:style>
+        <p:txBody>
+          <a:bodyPr rtlCol="0" anchor="ctr"/>
+          <a:lstStyle/>
+          <a:p>
+            <a:pPr algn="ctr"/>
+            <a:endParaRPr lang="de-DE" dirty="0"/>
+          </a:p>
+        </p:txBody>
+      </p:sp>
+      <p:cxnSp>
+        <p:nvCxnSpPr>
+          <p:cNvPr id="66" name="Gerade Verbindung mit Pfeil 65"/>
+          <p:cNvCxnSpPr>
+            <a:stCxn id="55" idx="7"/>
+            <a:endCxn id="56" idx="3"/>
+          </p:cNvCxnSpPr>
+          <p:nvPr/>
+        </p:nvCxnSpPr>
+        <p:spPr>
+          <a:xfrm flipV="1">
+            <a:off x="4834720" y="2113485"/>
+            <a:ext cx="600562" cy="527059"/>
+          </a:xfrm>
+          <a:prstGeom prst="straightConnector1">
+            <a:avLst/>
+          </a:prstGeom>
+          <a:ln w="19050">
+            <a:solidFill>
+              <a:schemeClr val="accent1">
+                <a:lumMod val="50000"/>
+              </a:schemeClr>
+            </a:solidFill>
+            <a:headEnd w="lg" len="med"/>
+            <a:tailEnd type="triangle"/>
+          </a:ln>
+        </p:spPr>
+        <p:style>
+          <a:lnRef idx="1">
+            <a:schemeClr val="accent1"/>
+          </a:lnRef>
+          <a:fillRef idx="0">
+            <a:schemeClr val="accent1"/>
+          </a:fillRef>
+          <a:effectRef idx="0">
+            <a:schemeClr val="accent1"/>
+          </a:effectRef>
+          <a:fontRef idx="minor">
+            <a:schemeClr val="tx1"/>
+          </a:fontRef>
+        </p:style>
+      </p:cxnSp>
+      <p:cxnSp>
+        <p:nvCxnSpPr>
+          <p:cNvPr id="69" name="Gerade Verbindung mit Pfeil 68"/>
+          <p:cNvCxnSpPr>
+            <a:stCxn id="56" idx="5"/>
+            <a:endCxn id="57" idx="1"/>
+          </p:cNvCxnSpPr>
+          <p:nvPr/>
+        </p:nvCxnSpPr>
+        <p:spPr>
+          <a:xfrm>
+            <a:off x="5613472" y="2113485"/>
+            <a:ext cx="334770" cy="593614"/>
+          </a:xfrm>
+          <a:prstGeom prst="straightConnector1">
+            <a:avLst/>
+          </a:prstGeom>
+          <a:ln w="19050">
+            <a:solidFill>
+              <a:schemeClr val="accent1">
+                <a:lumMod val="50000"/>
+              </a:schemeClr>
+            </a:solidFill>
+            <a:headEnd w="lg" len="med"/>
+            <a:tailEnd type="triangle"/>
+          </a:ln>
+        </p:spPr>
+        <p:style>
+          <a:lnRef idx="1">
+            <a:schemeClr val="accent1"/>
+          </a:lnRef>
+          <a:fillRef idx="0">
+            <a:schemeClr val="accent1"/>
+          </a:fillRef>
+          <a:effectRef idx="0">
+            <a:schemeClr val="accent1"/>
+          </a:effectRef>
+          <a:fontRef idx="minor">
+            <a:schemeClr val="tx1"/>
+          </a:fontRef>
+        </p:style>
+      </p:cxnSp>
+      <p:cxnSp>
+        <p:nvCxnSpPr>
+          <p:cNvPr id="72" name="Gerade Verbindung mit Pfeil 71"/>
+          <p:cNvCxnSpPr>
+            <a:stCxn id="61" idx="7"/>
+            <a:endCxn id="64" idx="3"/>
+          </p:cNvCxnSpPr>
+          <p:nvPr/>
+        </p:nvCxnSpPr>
+        <p:spPr>
+          <a:xfrm flipV="1">
+            <a:off x="6489886" y="2901351"/>
+            <a:ext cx="497123" cy="447716"/>
+          </a:xfrm>
+          <a:prstGeom prst="straightConnector1">
+            <a:avLst/>
+          </a:prstGeom>
+          <a:ln w="19050">
+            <a:solidFill>
+              <a:schemeClr val="accent1">
+                <a:lumMod val="50000"/>
+              </a:schemeClr>
+            </a:solidFill>
+            <a:headEnd w="lg" len="med"/>
+            <a:tailEnd type="triangle"/>
+          </a:ln>
+        </p:spPr>
+        <p:style>
+          <a:lnRef idx="1">
+            <a:schemeClr val="accent1"/>
+          </a:lnRef>
+          <a:fillRef idx="0">
+            <a:schemeClr val="accent1"/>
+          </a:fillRef>
+          <a:effectRef idx="0">
+            <a:schemeClr val="accent1"/>
+          </a:effectRef>
+          <a:fontRef idx="minor">
+            <a:schemeClr val="tx1"/>
+          </a:fontRef>
+        </p:style>
+      </p:cxnSp>
+      <p:cxnSp>
+        <p:nvCxnSpPr>
+          <p:cNvPr id="77" name="Gerade Verbindung mit Pfeil 76"/>
+          <p:cNvCxnSpPr>
+            <a:stCxn id="64" idx="1"/>
+            <a:endCxn id="62" idx="5"/>
+          </p:cNvCxnSpPr>
+          <p:nvPr/>
+        </p:nvCxnSpPr>
+        <p:spPr>
+          <a:xfrm flipH="1" flipV="1">
+            <a:off x="6507853" y="2165898"/>
+            <a:ext cx="479156" cy="557263"/>
+          </a:xfrm>
+          <a:prstGeom prst="straightConnector1">
+            <a:avLst/>
+          </a:prstGeom>
+          <a:ln w="19050">
+            <a:solidFill>
+              <a:schemeClr val="accent1">
+                <a:lumMod val="50000"/>
+              </a:schemeClr>
+            </a:solidFill>
+            <a:headEnd w="lg" len="med"/>
+            <a:tailEnd type="triangle"/>
+          </a:ln>
+        </p:spPr>
+        <p:style>
+          <a:lnRef idx="1">
+            <a:schemeClr val="accent1"/>
+          </a:lnRef>
+          <a:fillRef idx="0">
+            <a:schemeClr val="accent1"/>
+          </a:fillRef>
+          <a:effectRef idx="0">
+            <a:schemeClr val="accent1"/>
+          </a:effectRef>
+          <a:fontRef idx="minor">
+            <a:schemeClr val="tx1"/>
+          </a:fontRef>
+        </p:style>
+      </p:cxnSp>
+      <p:cxnSp>
+        <p:nvCxnSpPr>
+          <p:cNvPr id="80" name="Gerade Verbindung mit Pfeil 79"/>
+          <p:cNvCxnSpPr>
+            <a:stCxn id="62" idx="3"/>
+            <a:endCxn id="57" idx="7"/>
+          </p:cNvCxnSpPr>
+          <p:nvPr/>
+        </p:nvCxnSpPr>
+        <p:spPr>
+          <a:xfrm flipH="1">
+            <a:off x="6126432" y="2165898"/>
+            <a:ext cx="203231" cy="541201"/>
+          </a:xfrm>
+          <a:prstGeom prst="straightConnector1">
+            <a:avLst/>
+          </a:prstGeom>
+          <a:ln w="19050">
+            <a:solidFill>
+              <a:schemeClr val="accent1">
+                <a:lumMod val="50000"/>
+              </a:schemeClr>
+            </a:solidFill>
+            <a:headEnd w="lg" len="med"/>
+            <a:tailEnd type="triangle"/>
+          </a:ln>
+        </p:spPr>
+        <p:style>
+          <a:lnRef idx="1">
+            <a:schemeClr val="accent1"/>
+          </a:lnRef>
+          <a:fillRef idx="0">
+            <a:schemeClr val="accent1"/>
+          </a:fillRef>
+          <a:effectRef idx="0">
+            <a:schemeClr val="accent1"/>
+          </a:effectRef>
+          <a:fontRef idx="minor">
+            <a:schemeClr val="tx1"/>
+          </a:fontRef>
+        </p:style>
+      </p:cxnSp>
+      <p:cxnSp>
+        <p:nvCxnSpPr>
+          <p:cNvPr id="83" name="Gerade Verbindung mit Pfeil 82"/>
+          <p:cNvCxnSpPr>
+            <a:stCxn id="62" idx="2"/>
+            <a:endCxn id="56" idx="6"/>
+          </p:cNvCxnSpPr>
+          <p:nvPr/>
+        </p:nvCxnSpPr>
+        <p:spPr>
+          <a:xfrm flipH="1" flipV="1">
+            <a:off x="5650377" y="2024390"/>
+            <a:ext cx="642381" cy="52413"/>
+          </a:xfrm>
+          <a:prstGeom prst="straightConnector1">
+            <a:avLst/>
+          </a:prstGeom>
+          <a:ln w="19050">
+            <a:solidFill>
+              <a:schemeClr val="accent1">
+                <a:lumMod val="50000"/>
+              </a:schemeClr>
+            </a:solidFill>
+            <a:headEnd w="lg" len="med"/>
+            <a:tailEnd type="triangle"/>
+          </a:ln>
+        </p:spPr>
+        <p:style>
+          <a:lnRef idx="1">
+            <a:schemeClr val="accent1"/>
+          </a:lnRef>
+          <a:fillRef idx="0">
+            <a:schemeClr val="accent1"/>
+          </a:fillRef>
+          <a:effectRef idx="0">
+            <a:schemeClr val="accent1"/>
+          </a:effectRef>
+          <a:fontRef idx="minor">
+            <a:schemeClr val="tx1"/>
+          </a:fontRef>
+        </p:style>
+      </p:cxnSp>
+      <p:cxnSp>
+        <p:nvCxnSpPr>
+          <p:cNvPr id="86" name="Gerade Verbindung mit Pfeil 85"/>
+          <p:cNvCxnSpPr>
+            <a:stCxn id="57" idx="3"/>
+            <a:endCxn id="59" idx="7"/>
+          </p:cNvCxnSpPr>
+          <p:nvPr/>
+        </p:nvCxnSpPr>
+        <p:spPr>
+          <a:xfrm flipH="1">
+            <a:off x="5835055" y="2885289"/>
+            <a:ext cx="113187" cy="453586"/>
+          </a:xfrm>
+          <a:prstGeom prst="straightConnector1">
+            <a:avLst/>
+          </a:prstGeom>
+          <a:ln w="19050">
+            <a:solidFill>
+              <a:schemeClr val="accent1">
+                <a:lumMod val="50000"/>
+              </a:schemeClr>
+            </a:solidFill>
+            <a:headEnd w="lg" len="med"/>
+            <a:tailEnd type="triangle"/>
+          </a:ln>
+        </p:spPr>
+        <p:style>
+          <a:lnRef idx="1">
+            <a:schemeClr val="accent1"/>
+          </a:lnRef>
+          <a:fillRef idx="0">
+            <a:schemeClr val="accent1"/>
+          </a:fillRef>
+          <a:effectRef idx="0">
+            <a:schemeClr val="accent1"/>
+          </a:effectRef>
+          <a:fontRef idx="minor">
+            <a:schemeClr val="tx1"/>
+          </a:fontRef>
+        </p:style>
+      </p:cxnSp>
+      <p:cxnSp>
+        <p:nvCxnSpPr>
+          <p:cNvPr id="89" name="Gerade Verbindung mit Pfeil 88"/>
+          <p:cNvCxnSpPr>
+            <a:stCxn id="55" idx="5"/>
+            <a:endCxn id="59" idx="1"/>
+          </p:cNvCxnSpPr>
+          <p:nvPr/>
+        </p:nvCxnSpPr>
+        <p:spPr>
+          <a:xfrm>
+            <a:off x="4834720" y="2818734"/>
+            <a:ext cx="822145" cy="520141"/>
+          </a:xfrm>
+          <a:prstGeom prst="straightConnector1">
+            <a:avLst/>
+          </a:prstGeom>
+          <a:ln w="19050">
+            <a:solidFill>
+              <a:schemeClr val="accent1">
+                <a:lumMod val="50000"/>
+              </a:schemeClr>
+            </a:solidFill>
+            <a:headEnd w="lg" len="med"/>
+            <a:tailEnd type="triangle"/>
+          </a:ln>
+        </p:spPr>
+        <p:style>
+          <a:lnRef idx="1">
+            <a:schemeClr val="accent1"/>
+          </a:lnRef>
+          <a:fillRef idx="0">
+            <a:schemeClr val="accent1"/>
+          </a:fillRef>
+          <a:effectRef idx="0">
+            <a:schemeClr val="accent1"/>
+          </a:effectRef>
+          <a:fontRef idx="minor">
+            <a:schemeClr val="tx1"/>
+          </a:fontRef>
+        </p:style>
+      </p:cxnSp>
+      <p:cxnSp>
+        <p:nvCxnSpPr>
+          <p:cNvPr id="92" name="Gerade Verbindung mit Pfeil 91"/>
+          <p:cNvCxnSpPr>
+            <a:stCxn id="58" idx="0"/>
+            <a:endCxn id="55" idx="4"/>
+          </p:cNvCxnSpPr>
+          <p:nvPr/>
+        </p:nvCxnSpPr>
+        <p:spPr>
+          <a:xfrm flipH="1" flipV="1">
+            <a:off x="4745625" y="2855639"/>
+            <a:ext cx="30750" cy="922256"/>
+          </a:xfrm>
+          <a:prstGeom prst="straightConnector1">
+            <a:avLst/>
+          </a:prstGeom>
+          <a:ln w="19050">
+            <a:solidFill>
+              <a:schemeClr val="accent1">
+                <a:lumMod val="50000"/>
+              </a:schemeClr>
+            </a:solidFill>
+            <a:headEnd w="lg" len="med"/>
+            <a:tailEnd type="triangle"/>
+          </a:ln>
+        </p:spPr>
+        <p:style>
+          <a:lnRef idx="1">
+            <a:schemeClr val="accent1"/>
+          </a:lnRef>
+          <a:fillRef idx="0">
+            <a:schemeClr val="accent1"/>
+          </a:fillRef>
+          <a:effectRef idx="0">
+            <a:schemeClr val="accent1"/>
+          </a:effectRef>
+          <a:fontRef idx="minor">
+            <a:schemeClr val="tx1"/>
+          </a:fontRef>
+        </p:style>
+      </p:cxnSp>
+      <p:cxnSp>
+        <p:nvCxnSpPr>
+          <p:cNvPr id="95" name="Gerade Verbindung mit Pfeil 94"/>
+          <p:cNvCxnSpPr>
+            <a:stCxn id="58" idx="5"/>
+            <a:endCxn id="60" idx="2"/>
+          </p:cNvCxnSpPr>
+          <p:nvPr/>
+        </p:nvCxnSpPr>
+        <p:spPr>
+          <a:xfrm>
+            <a:off x="4865470" y="3992990"/>
+            <a:ext cx="893896" cy="253881"/>
+          </a:xfrm>
+          <a:prstGeom prst="straightConnector1">
+            <a:avLst/>
+          </a:prstGeom>
+          <a:ln w="19050">
+            <a:solidFill>
+              <a:schemeClr val="accent1">
+                <a:lumMod val="50000"/>
+              </a:schemeClr>
+            </a:solidFill>
+            <a:headEnd w="lg" len="med"/>
+            <a:tailEnd type="triangle"/>
+          </a:ln>
+        </p:spPr>
+        <p:style>
+          <a:lnRef idx="1">
+            <a:schemeClr val="accent1"/>
+          </a:lnRef>
+          <a:fillRef idx="0">
+            <a:schemeClr val="accent1"/>
+          </a:fillRef>
+          <a:effectRef idx="0">
+            <a:schemeClr val="accent1"/>
+          </a:effectRef>
+          <a:fontRef idx="minor">
+            <a:schemeClr val="tx1"/>
+          </a:fontRef>
+        </p:style>
+      </p:cxnSp>
+      <p:cxnSp>
+        <p:nvCxnSpPr>
+          <p:cNvPr id="98" name="Gerade Verbindung mit Pfeil 97"/>
+          <p:cNvCxnSpPr>
+            <a:stCxn id="59" idx="4"/>
+            <a:endCxn id="60" idx="0"/>
+          </p:cNvCxnSpPr>
+          <p:nvPr/>
+        </p:nvCxnSpPr>
+        <p:spPr>
+          <a:xfrm>
+            <a:off x="5745960" y="3553970"/>
+            <a:ext cx="139406" cy="566901"/>
+          </a:xfrm>
+          <a:prstGeom prst="straightConnector1">
+            <a:avLst/>
+          </a:prstGeom>
+          <a:ln w="19050">
+            <a:solidFill>
+              <a:schemeClr val="accent1">
+                <a:lumMod val="50000"/>
+              </a:schemeClr>
+            </a:solidFill>
+            <a:headEnd w="lg" len="med"/>
+            <a:tailEnd type="triangle"/>
+          </a:ln>
+        </p:spPr>
+        <p:style>
+          <a:lnRef idx="1">
+            <a:schemeClr val="accent1"/>
+          </a:lnRef>
+          <a:fillRef idx="0">
+            <a:schemeClr val="accent1"/>
+          </a:fillRef>
+          <a:effectRef idx="0">
+            <a:schemeClr val="accent1"/>
+          </a:effectRef>
+          <a:fontRef idx="minor">
+            <a:schemeClr val="tx1"/>
+          </a:fontRef>
+        </p:style>
+      </p:cxnSp>
+      <p:cxnSp>
+        <p:nvCxnSpPr>
+          <p:cNvPr id="105" name="Gerade Verbindung mit Pfeil 104"/>
+          <p:cNvCxnSpPr>
+            <a:stCxn id="63" idx="1"/>
+            <a:endCxn id="61" idx="5"/>
+          </p:cNvCxnSpPr>
+          <p:nvPr/>
+        </p:nvCxnSpPr>
+        <p:spPr>
+          <a:xfrm flipH="1" flipV="1">
+            <a:off x="6489886" y="3527257"/>
+            <a:ext cx="371123" cy="557263"/>
+          </a:xfrm>
+          <a:prstGeom prst="straightConnector1">
+            <a:avLst/>
+          </a:prstGeom>
+          <a:ln w="19050">
+            <a:solidFill>
+              <a:schemeClr val="accent1">
+                <a:lumMod val="50000"/>
+              </a:schemeClr>
+            </a:solidFill>
+            <a:headEnd w="lg" len="med"/>
+            <a:tailEnd type="triangle"/>
+          </a:ln>
+        </p:spPr>
+        <p:style>
+          <a:lnRef idx="1">
+            <a:schemeClr val="accent1"/>
+          </a:lnRef>
+          <a:fillRef idx="0">
+            <a:schemeClr val="accent1"/>
+          </a:fillRef>
+          <a:effectRef idx="0">
+            <a:schemeClr val="accent1"/>
+          </a:effectRef>
+          <a:fontRef idx="minor">
+            <a:schemeClr val="tx1"/>
+          </a:fontRef>
+        </p:style>
+      </p:cxnSp>
+      <p:cxnSp>
+        <p:nvCxnSpPr>
+          <p:cNvPr id="110" name="Gerade Verbindung mit Pfeil 109"/>
+          <p:cNvCxnSpPr>
+            <a:stCxn id="63" idx="3"/>
+            <a:endCxn id="60" idx="6"/>
+          </p:cNvCxnSpPr>
+          <p:nvPr/>
+        </p:nvCxnSpPr>
+        <p:spPr>
+          <a:xfrm flipH="1" flipV="1">
+            <a:off x="6011366" y="4246871"/>
+            <a:ext cx="849643" cy="15839"/>
+          </a:xfrm>
+          <a:prstGeom prst="straightConnector1">
+            <a:avLst/>
+          </a:prstGeom>
+          <a:ln w="19050">
+            <a:solidFill>
+              <a:schemeClr val="accent1">
+                <a:lumMod val="50000"/>
+              </a:schemeClr>
+            </a:solidFill>
+            <a:headEnd w="lg" len="med"/>
+            <a:tailEnd type="triangle"/>
+          </a:ln>
+        </p:spPr>
+        <p:style>
+          <a:lnRef idx="1">
+            <a:schemeClr val="accent1"/>
+          </a:lnRef>
+          <a:fillRef idx="0">
+            <a:schemeClr val="accent1"/>
+          </a:fillRef>
+          <a:effectRef idx="0">
+            <a:schemeClr val="accent1"/>
+          </a:effectRef>
+          <a:fontRef idx="minor">
+            <a:schemeClr val="tx1"/>
+          </a:fontRef>
+        </p:style>
+      </p:cxnSp>
+      <p:cxnSp>
+        <p:nvCxnSpPr>
+          <p:cNvPr id="113" name="Gerade Verbindung mit Pfeil 112"/>
+          <p:cNvCxnSpPr>
+            <a:stCxn id="60" idx="5"/>
+            <a:endCxn id="63" idx="4"/>
+          </p:cNvCxnSpPr>
+          <p:nvPr/>
+        </p:nvCxnSpPr>
+        <p:spPr>
+          <a:xfrm flipV="1">
+            <a:off x="5974461" y="4299615"/>
+            <a:ext cx="975643" cy="36351"/>
+          </a:xfrm>
+          <a:prstGeom prst="straightConnector1">
+            <a:avLst/>
+          </a:prstGeom>
+          <a:ln w="19050">
+            <a:solidFill>
+              <a:schemeClr val="accent1">
+                <a:lumMod val="50000"/>
+              </a:schemeClr>
+            </a:solidFill>
+            <a:headEnd w="lg" len="med"/>
+            <a:tailEnd type="triangle"/>
+          </a:ln>
+        </p:spPr>
+        <p:style>
+          <a:lnRef idx="1">
+            <a:schemeClr val="accent1"/>
+          </a:lnRef>
+          <a:fillRef idx="0">
+            <a:schemeClr val="accent1"/>
+          </a:fillRef>
+          <a:effectRef idx="0">
+            <a:schemeClr val="accent1"/>
+          </a:effectRef>
+          <a:fontRef idx="minor">
+            <a:schemeClr val="tx1"/>
+          </a:fontRef>
+        </p:style>
+      </p:cxnSp>
+      <p:cxnSp>
+        <p:nvCxnSpPr>
+          <p:cNvPr id="116" name="Gerade Verbindung mit Pfeil 115"/>
+          <p:cNvCxnSpPr>
+            <a:stCxn id="60" idx="7"/>
+            <a:endCxn id="61" idx="3"/>
+          </p:cNvCxnSpPr>
+          <p:nvPr/>
+        </p:nvCxnSpPr>
+        <p:spPr>
+          <a:xfrm flipV="1">
+            <a:off x="5974461" y="3527257"/>
+            <a:ext cx="337235" cy="630519"/>
+          </a:xfrm>
+          <a:prstGeom prst="straightConnector1">
+            <a:avLst/>
+          </a:prstGeom>
+          <a:ln w="19050">
+            <a:solidFill>
+              <a:schemeClr val="accent1">
+                <a:lumMod val="50000"/>
+              </a:schemeClr>
+            </a:solidFill>
+            <a:headEnd w="lg" len="med"/>
+            <a:tailEnd type="triangle"/>
+          </a:ln>
+        </p:spPr>
+        <p:style>
+          <a:lnRef idx="1">
+            <a:schemeClr val="accent1"/>
+          </a:lnRef>
+          <a:fillRef idx="0">
+            <a:schemeClr val="accent1"/>
+          </a:fillRef>
+          <a:effectRef idx="0">
+            <a:schemeClr val="accent1"/>
+          </a:effectRef>
+          <a:fontRef idx="minor">
+            <a:schemeClr val="tx1"/>
+          </a:fontRef>
+        </p:style>
+      </p:cxnSp>
+      <p:cxnSp>
+        <p:nvCxnSpPr>
+          <p:cNvPr id="119" name="Gerade Verbindung mit Pfeil 118"/>
+          <p:cNvCxnSpPr>
+            <a:stCxn id="64" idx="4"/>
+            <a:endCxn id="63" idx="7"/>
+          </p:cNvCxnSpPr>
+          <p:nvPr/>
+        </p:nvCxnSpPr>
+        <p:spPr>
+          <a:xfrm flipH="1">
+            <a:off x="7039199" y="2938256"/>
+            <a:ext cx="36905" cy="1146264"/>
+          </a:xfrm>
+          <a:prstGeom prst="straightConnector1">
+            <a:avLst/>
+          </a:prstGeom>
+          <a:ln w="19050">
+            <a:solidFill>
+              <a:schemeClr val="accent1">
+                <a:lumMod val="50000"/>
+              </a:schemeClr>
+            </a:solidFill>
+            <a:headEnd w="lg" len="med"/>
+            <a:tailEnd type="triangle"/>
+          </a:ln>
+        </p:spPr>
+        <p:style>
+          <a:lnRef idx="1">
+            <a:schemeClr val="accent1"/>
+          </a:lnRef>
+          <a:fillRef idx="0">
+            <a:schemeClr val="accent1"/>
+          </a:fillRef>
+          <a:effectRef idx="0">
+            <a:schemeClr val="accent1"/>
+          </a:effectRef>
+          <a:fontRef idx="minor">
+            <a:schemeClr val="tx1"/>
+          </a:fontRef>
+        </p:style>
+      </p:cxnSp>
+      <p:cxnSp>
+        <p:nvCxnSpPr>
+          <p:cNvPr id="126" name="Gekrümmter Verbinder 125"/>
+          <p:cNvCxnSpPr>
+            <a:stCxn id="56" idx="2"/>
+            <a:endCxn id="56" idx="0"/>
+          </p:cNvCxnSpPr>
+          <p:nvPr/>
+        </p:nvCxnSpPr>
+        <p:spPr>
+          <a:xfrm rot="10800000" flipH="1">
+            <a:off x="5398377" y="1898390"/>
+            <a:ext cx="126000" cy="126000"/>
+          </a:xfrm>
+          <a:prstGeom prst="curvedConnector4">
+            <a:avLst>
+              <a:gd name="adj1" fmla="val -128513"/>
+              <a:gd name="adj2" fmla="val 266310"/>
+            </a:avLst>
+          </a:prstGeom>
+          <a:ln w="19050">
+            <a:solidFill>
+              <a:schemeClr val="accent1">
+                <a:lumMod val="50000"/>
+              </a:schemeClr>
+            </a:solidFill>
+            <a:tailEnd type="triangle"/>
+          </a:ln>
+        </p:spPr>
+        <p:style>
+          <a:lnRef idx="1">
+            <a:schemeClr val="accent1"/>
+          </a:lnRef>
+          <a:fillRef idx="0">
+            <a:schemeClr val="accent1"/>
+          </a:fillRef>
+          <a:effectRef idx="0">
+            <a:schemeClr val="accent1"/>
+          </a:effectRef>
+          <a:fontRef idx="minor">
+            <a:schemeClr val="tx1"/>
+          </a:fontRef>
+        </p:style>
+      </p:cxnSp>
+      <p:cxnSp>
+        <p:nvCxnSpPr>
+          <p:cNvPr id="138" name="Gekrümmter Verbinder 137"/>
+          <p:cNvCxnSpPr>
+            <a:stCxn id="57" idx="4"/>
+            <a:endCxn id="57" idx="6"/>
+          </p:cNvCxnSpPr>
+          <p:nvPr/>
+        </p:nvCxnSpPr>
+        <p:spPr>
+          <a:xfrm rot="5400000" flipH="1" flipV="1">
+            <a:off x="6037337" y="2796194"/>
+            <a:ext cx="126000" cy="126000"/>
+          </a:xfrm>
+          <a:prstGeom prst="curvedConnector4">
+            <a:avLst>
+              <a:gd name="adj1" fmla="val -120953"/>
+              <a:gd name="adj2" fmla="val 251191"/>
+            </a:avLst>
+          </a:prstGeom>
+          <a:ln w="19050">
+            <a:solidFill>
+              <a:schemeClr val="accent1">
+                <a:lumMod val="50000"/>
+              </a:schemeClr>
+            </a:solidFill>
+            <a:tailEnd type="triangle"/>
+          </a:ln>
+        </p:spPr>
+        <p:style>
+          <a:lnRef idx="1">
+            <a:schemeClr val="accent1"/>
+          </a:lnRef>
+          <a:fillRef idx="0">
+            <a:schemeClr val="accent1"/>
+          </a:fillRef>
+          <a:effectRef idx="0">
+            <a:schemeClr val="accent1"/>
+          </a:effectRef>
+          <a:fontRef idx="minor">
+            <a:schemeClr val="tx1"/>
+          </a:fontRef>
+        </p:style>
+      </p:cxnSp>
+      <p:cxnSp>
+        <p:nvCxnSpPr>
+          <p:cNvPr id="145" name="Gekrümmter Verbinder 144"/>
+          <p:cNvCxnSpPr>
+            <a:stCxn id="58" idx="5"/>
+            <a:endCxn id="58" idx="1"/>
+          </p:cNvCxnSpPr>
+          <p:nvPr/>
+        </p:nvCxnSpPr>
+        <p:spPr>
+          <a:xfrm rot="5400000" flipH="1">
+            <a:off x="4687280" y="3814800"/>
+            <a:ext cx="178190" cy="178190"/>
+          </a:xfrm>
+          <a:prstGeom prst="curvedConnector5">
+            <a:avLst>
+              <a:gd name="adj1" fmla="val -96218"/>
+              <a:gd name="adj2" fmla="val 222273"/>
+              <a:gd name="adj3" fmla="val 89309"/>
+            </a:avLst>
+          </a:prstGeom>
+          <a:ln w="19050">
+            <a:solidFill>
+              <a:schemeClr val="accent1">
+                <a:lumMod val="50000"/>
+              </a:schemeClr>
+            </a:solidFill>
+            <a:tailEnd type="triangle"/>
+          </a:ln>
+        </p:spPr>
+        <p:style>
+          <a:lnRef idx="1">
+            <a:schemeClr val="accent1"/>
+          </a:lnRef>
+          <a:fillRef idx="0">
+            <a:schemeClr val="accent1"/>
+          </a:fillRef>
+          <a:effectRef idx="0">
+            <a:schemeClr val="accent1"/>
+          </a:effectRef>
+          <a:fontRef idx="minor">
+            <a:schemeClr val="tx1"/>
+          </a:fontRef>
+        </p:style>
+      </p:cxnSp>
+      <mc:AlternateContent xmlns:mc="http://schemas.openxmlformats.org/markup-compatibility/2006">
+        <mc:Choice xmlns:a14="http://schemas.microsoft.com/office/drawing/2010/main" Requires="a14">
+          <p:sp>
+            <p:nvSpPr>
+              <p:cNvPr id="185" name="Textfeld 184"/>
+              <p:cNvSpPr txBox="1"/>
+              <p:nvPr/>
+            </p:nvSpPr>
+            <p:spPr>
+              <a:xfrm>
+                <a:off x="1421296" y="2796194"/>
+                <a:ext cx="655982" cy="369332"/>
+              </a:xfrm>
+              <a:prstGeom prst="rect">
+                <a:avLst/>
+              </a:prstGeom>
+              <a:noFill/>
+            </p:spPr>
+            <p:txBody>
+              <a:bodyPr wrap="square" rtlCol="0">
+                <a:spAutoFit/>
+              </a:bodyPr>
+              <a:lstStyle/>
+              <a:p>
+                <a14:m>
+                  <m:oMathPara xmlns:m="http://schemas.openxmlformats.org/officeDocument/2006/math">
+                    <m:oMathParaPr>
+                      <m:jc m:val="centerGroup"/>
+                    </m:oMathParaPr>
+                    <m:oMath xmlns:m="http://schemas.openxmlformats.org/officeDocument/2006/math">
+                      <m:r>
+                        <a:rPr lang="de-DE" b="1" i="1" smtClean="0">
+                          <a:solidFill>
+                            <a:schemeClr val="tx2">
+                              <a:lumMod val="50000"/>
+                            </a:schemeClr>
+                          </a:solidFill>
+                          <a:latin typeface="Cambria Math" panose="02040503050406030204" pitchFamily="18" charset="0"/>
+                        </a:rPr>
+                        <m:t>𝒙</m:t>
+                      </m:r>
+                      <m:d>
+                        <m:dPr>
+                          <m:ctrlPr>
+                            <a:rPr lang="de-DE" b="1" i="1" smtClean="0">
+                              <a:solidFill>
+                                <a:schemeClr val="tx2">
+                                  <a:lumMod val="50000"/>
+                                </a:schemeClr>
+                              </a:solidFill>
+                              <a:latin typeface="Cambria Math" panose="02040503050406030204" pitchFamily="18" charset="0"/>
+                            </a:rPr>
+                          </m:ctrlPr>
+                        </m:dPr>
+                        <m:e>
+                          <m:r>
+                            <a:rPr lang="de-DE" b="1" i="1" smtClean="0">
+                              <a:solidFill>
+                                <a:schemeClr val="tx2">
+                                  <a:lumMod val="50000"/>
+                                </a:schemeClr>
+                              </a:solidFill>
+                              <a:latin typeface="Cambria Math" panose="02040503050406030204" pitchFamily="18" charset="0"/>
+                            </a:rPr>
+                            <m:t>𝒕</m:t>
+                          </m:r>
+                        </m:e>
+                      </m:d>
+                    </m:oMath>
+                  </m:oMathPara>
+                </a14:m>
+                <a:endParaRPr lang="de-DE" b="1" dirty="0">
+                  <a:solidFill>
+                    <a:schemeClr val="tx2">
+                      <a:lumMod val="50000"/>
+                    </a:schemeClr>
+                  </a:solidFill>
+                </a:endParaRPr>
+              </a:p>
+            </p:txBody>
+          </p:sp>
+        </mc:Choice>
+        <mc:Fallback>
+          <p:sp>
+            <p:nvSpPr>
+              <p:cNvPr id="185" name="Textfeld 184"/>
+              <p:cNvSpPr txBox="1">
+                <a:spLocks noRot="1" noChangeAspect="1" noMove="1" noResize="1" noEditPoints="1" noAdjustHandles="1" noChangeArrowheads="1" noChangeShapeType="1" noTextEdit="1"/>
+              </p:cNvSpPr>
+              <p:nvPr/>
+            </p:nvSpPr>
+            <p:spPr>
+              <a:xfrm>
+                <a:off x="1421296" y="2796194"/>
+                <a:ext cx="655982" cy="369332"/>
+              </a:xfrm>
+              <a:prstGeom prst="rect">
+                <a:avLst/>
+              </a:prstGeom>
+              <a:blipFill>
+                <a:blip r:embed="rId6"/>
+                <a:stretch>
+                  <a:fillRect/>
+                </a:stretch>
+              </a:blipFill>
+            </p:spPr>
+            <p:txBody>
+              <a:bodyPr/>
+              <a:lstStyle/>
+              <a:p>
+                <a:r>
+                  <a:rPr lang="de-DE">
+                    <a:noFill/>
+                  </a:rPr>
+                  <a:t> </a:t>
+                </a:r>
+              </a:p>
+            </p:txBody>
+          </p:sp>
+        </mc:Fallback>
+      </mc:AlternateContent>
+      <mc:AlternateContent xmlns:mc="http://schemas.openxmlformats.org/markup-compatibility/2006">
+        <mc:Choice xmlns:a14="http://schemas.microsoft.com/office/drawing/2010/main" Requires="a14">
+          <p:sp>
+            <p:nvSpPr>
+              <p:cNvPr id="186" name="Textfeld 185"/>
+              <p:cNvSpPr txBox="1"/>
+              <p:nvPr/>
+            </p:nvSpPr>
+            <p:spPr>
+              <a:xfrm>
+                <a:off x="9177830" y="5779136"/>
+                <a:ext cx="1209514" cy="369332"/>
+              </a:xfrm>
+              <a:prstGeom prst="rect">
+                <a:avLst/>
+              </a:prstGeom>
+              <a:noFill/>
+            </p:spPr>
+            <p:txBody>
+              <a:bodyPr wrap="square" rtlCol="0">
+                <a:spAutoFit/>
+              </a:bodyPr>
+              <a:lstStyle/>
+              <a:p>
+                <a14:m>
+                  <m:oMathPara xmlns:m="http://schemas.openxmlformats.org/officeDocument/2006/math">
+                    <m:oMathParaPr>
+                      <m:jc m:val="centerGroup"/>
+                    </m:oMathParaPr>
+                    <m:oMath xmlns:m="http://schemas.openxmlformats.org/officeDocument/2006/math">
+                      <m:r>
+                        <a:rPr lang="de-DE" b="1" i="1" smtClean="0">
+                          <a:solidFill>
+                            <a:schemeClr val="tx2">
+                              <a:lumMod val="50000"/>
+                            </a:schemeClr>
+                          </a:solidFill>
+                          <a:latin typeface="Cambria Math" panose="02040503050406030204" pitchFamily="18" charset="0"/>
+                        </a:rPr>
+                        <m:t>𝒙</m:t>
+                      </m:r>
+                      <m:d>
+                        <m:dPr>
+                          <m:ctrlPr>
+                            <a:rPr lang="de-DE" b="1" i="1" smtClean="0">
+                              <a:solidFill>
+                                <a:schemeClr val="tx2">
+                                  <a:lumMod val="50000"/>
+                                </a:schemeClr>
+                              </a:solidFill>
+                              <a:latin typeface="Cambria Math" panose="02040503050406030204" pitchFamily="18" charset="0"/>
+                            </a:rPr>
+                          </m:ctrlPr>
+                        </m:dPr>
+                        <m:e>
+                          <m:r>
+                            <a:rPr lang="de-DE" b="1" i="1" smtClean="0">
+                              <a:solidFill>
+                                <a:schemeClr val="tx2">
+                                  <a:lumMod val="50000"/>
+                                </a:schemeClr>
+                              </a:solidFill>
+                              <a:latin typeface="Cambria Math" panose="02040503050406030204" pitchFamily="18" charset="0"/>
+                            </a:rPr>
+                            <m:t>𝒕</m:t>
+                          </m:r>
+                          <m:r>
+                            <a:rPr lang="de-DE" b="1" i="1" smtClean="0">
+                              <a:solidFill>
+                                <a:schemeClr val="tx2">
+                                  <a:lumMod val="50000"/>
+                                </a:schemeClr>
+                              </a:solidFill>
+                              <a:latin typeface="Cambria Math" panose="02040503050406030204" pitchFamily="18" charset="0"/>
+                            </a:rPr>
+                            <m:t>+</m:t>
+                          </m:r>
+                          <m:r>
+                            <a:rPr lang="de-DE" b="1" i="0" smtClean="0">
+                              <a:solidFill>
+                                <a:schemeClr val="tx2">
+                                  <a:lumMod val="50000"/>
+                                </a:schemeClr>
+                              </a:solidFill>
+                              <a:latin typeface="Cambria Math" panose="02040503050406030204" pitchFamily="18" charset="0"/>
+                            </a:rPr>
+                            <m:t>𝚫</m:t>
+                          </m:r>
+                          <m:r>
+                            <a:rPr lang="de-DE" b="1" i="1" smtClean="0">
+                              <a:solidFill>
+                                <a:schemeClr val="tx2">
+                                  <a:lumMod val="50000"/>
+                                </a:schemeClr>
+                              </a:solidFill>
+                              <a:latin typeface="Cambria Math" panose="02040503050406030204" pitchFamily="18" charset="0"/>
+                            </a:rPr>
+                            <m:t>𝒕</m:t>
+                          </m:r>
+                        </m:e>
+                      </m:d>
+                    </m:oMath>
+                  </m:oMathPara>
+                </a14:m>
+                <a:endParaRPr lang="de-DE" b="1" dirty="0">
+                  <a:solidFill>
+                    <a:schemeClr val="tx2">
+                      <a:lumMod val="50000"/>
+                    </a:schemeClr>
+                  </a:solidFill>
+                </a:endParaRPr>
+              </a:p>
+            </p:txBody>
+          </p:sp>
+        </mc:Choice>
+        <mc:Fallback>
+          <p:sp>
+            <p:nvSpPr>
+              <p:cNvPr id="186" name="Textfeld 185"/>
+              <p:cNvSpPr txBox="1">
+                <a:spLocks noRot="1" noChangeAspect="1" noMove="1" noResize="1" noEditPoints="1" noAdjustHandles="1" noChangeArrowheads="1" noChangeShapeType="1" noTextEdit="1"/>
+              </p:cNvSpPr>
+              <p:nvPr/>
+            </p:nvSpPr>
+            <p:spPr>
+              <a:xfrm>
+                <a:off x="9177830" y="5779136"/>
+                <a:ext cx="1209514" cy="369332"/>
+              </a:xfrm>
+              <a:prstGeom prst="rect">
+                <a:avLst/>
+              </a:prstGeom>
+              <a:blipFill>
+                <a:blip r:embed="rId7"/>
+                <a:stretch>
+                  <a:fillRect/>
+                </a:stretch>
+              </a:blipFill>
+            </p:spPr>
+            <p:txBody>
+              <a:bodyPr/>
+              <a:lstStyle/>
+              <a:p>
+                <a:r>
+                  <a:rPr lang="de-DE">
+                    <a:noFill/>
+                  </a:rPr>
+                  <a:t> </a:t>
+                </a:r>
+              </a:p>
+            </p:txBody>
+          </p:sp>
+        </mc:Fallback>
+      </mc:AlternateContent>
+      <p:sp>
+        <p:nvSpPr>
+          <p:cNvPr id="187" name="Textfeld 186"/>
+          <p:cNvSpPr txBox="1"/>
+          <p:nvPr/>
+        </p:nvSpPr>
+        <p:spPr>
+          <a:xfrm>
+            <a:off x="5082627" y="152606"/>
+            <a:ext cx="1605478" cy="367747"/>
+          </a:xfrm>
+          <a:prstGeom prst="rect">
+            <a:avLst/>
+          </a:prstGeom>
+          <a:noFill/>
+        </p:spPr>
+        <p:txBody>
+          <a:bodyPr wrap="square" rtlCol="0">
+            <a:spAutoFit/>
+          </a:bodyPr>
+          <a:lstStyle/>
+          <a:p>
+            <a:r>
+              <a:rPr lang="de-DE" dirty="0" smtClean="0"/>
+              <a:t>Reservoir Layer</a:t>
+            </a:r>
+            <a:endParaRPr lang="de-DE" dirty="0"/>
+          </a:p>
+        </p:txBody>
+      </p:sp>
+      <p:sp>
+        <p:nvSpPr>
+          <p:cNvPr id="188" name="Textfeld 187"/>
+          <p:cNvSpPr txBox="1"/>
+          <p:nvPr/>
+        </p:nvSpPr>
+        <p:spPr>
+          <a:xfrm>
+            <a:off x="2173029" y="156036"/>
+            <a:ext cx="1233325" cy="367747"/>
+          </a:xfrm>
+          <a:prstGeom prst="rect">
+            <a:avLst/>
+          </a:prstGeom>
+          <a:noFill/>
+        </p:spPr>
+        <p:txBody>
+          <a:bodyPr wrap="square" rtlCol="0">
+            <a:spAutoFit/>
+          </a:bodyPr>
+          <a:lstStyle/>
+          <a:p>
+            <a:r>
+              <a:rPr lang="de-DE" dirty="0" smtClean="0"/>
+              <a:t>Input Layer</a:t>
+            </a:r>
+            <a:endParaRPr lang="de-DE" dirty="0"/>
+          </a:p>
+        </p:txBody>
+      </p:sp>
+      <p:sp>
+        <p:nvSpPr>
+          <p:cNvPr id="189" name="Textfeld 188"/>
+          <p:cNvSpPr txBox="1"/>
+          <p:nvPr/>
+        </p:nvSpPr>
+        <p:spPr>
+          <a:xfrm>
+            <a:off x="8646347" y="148057"/>
+            <a:ext cx="1403641" cy="367747"/>
+          </a:xfrm>
+          <a:prstGeom prst="rect">
+            <a:avLst/>
+          </a:prstGeom>
+          <a:noFill/>
+        </p:spPr>
+        <p:txBody>
+          <a:bodyPr wrap="square" rtlCol="0">
+            <a:spAutoFit/>
+          </a:bodyPr>
+          <a:lstStyle/>
+          <a:p>
+            <a:r>
+              <a:rPr lang="de-DE" dirty="0" smtClean="0"/>
+              <a:t>Output Layer</a:t>
+            </a:r>
+            <a:endParaRPr lang="de-DE" dirty="0"/>
+          </a:p>
+        </p:txBody>
+      </p:sp>
+    </p:spTree>
+    <p:extLst>
+      <p:ext uri="{BB962C8B-B14F-4D97-AF65-F5344CB8AC3E}">
+        <p14:creationId xmlns:p14="http://schemas.microsoft.com/office/powerpoint/2010/main" val="300572739"/>
+      </p:ext>
+    </p:extLst>
+  </p:cSld>
+  <p:clrMapOvr>
+    <a:masterClrMapping/>
+  </p:clrMapOvr>
+</p:sld>
+</file>
+
 <file path=ppt/theme/theme1.xml><?xml version="1.0" encoding="utf-8"?>
 <a:theme xmlns:a="http://schemas.openxmlformats.org/drawingml/2006/main" name="Office">
   <a:themeElements>

</xml_diff>

<commit_message>
Removed old results and old test-files Adapted mackeyglass to paper version ESN can be used with Delay coordinates as additional input
</commit_message>
<xml_diff>
--- a/Figures_Paper/Overview.pptx
+++ b/Figures_Paper/Overview.pptx
@@ -244,7 +244,7 @@
           <a:p>
             <a:fld id="{6D3EBFE4-0E72-47F8-BA46-312F5F36F48F}" type="datetimeFigureOut">
               <a:rPr lang="de-DE" smtClean="0"/>
-              <a:t>24.07.2020</a:t>
+              <a:t>20.01.2021</a:t>
             </a:fld>
             <a:endParaRPr lang="de-DE"/>
           </a:p>
@@ -414,7 +414,7 @@
           <a:p>
             <a:fld id="{6D3EBFE4-0E72-47F8-BA46-312F5F36F48F}" type="datetimeFigureOut">
               <a:rPr lang="de-DE" smtClean="0"/>
-              <a:t>24.07.2020</a:t>
+              <a:t>20.01.2021</a:t>
             </a:fld>
             <a:endParaRPr lang="de-DE"/>
           </a:p>
@@ -594,7 +594,7 @@
           <a:p>
             <a:fld id="{6D3EBFE4-0E72-47F8-BA46-312F5F36F48F}" type="datetimeFigureOut">
               <a:rPr lang="de-DE" smtClean="0"/>
-              <a:t>24.07.2020</a:t>
+              <a:t>20.01.2021</a:t>
             </a:fld>
             <a:endParaRPr lang="de-DE"/>
           </a:p>
@@ -764,7 +764,7 @@
           <a:p>
             <a:fld id="{6D3EBFE4-0E72-47F8-BA46-312F5F36F48F}" type="datetimeFigureOut">
               <a:rPr lang="de-DE" smtClean="0"/>
-              <a:t>24.07.2020</a:t>
+              <a:t>20.01.2021</a:t>
             </a:fld>
             <a:endParaRPr lang="de-DE"/>
           </a:p>
@@ -1010,7 +1010,7 @@
           <a:p>
             <a:fld id="{6D3EBFE4-0E72-47F8-BA46-312F5F36F48F}" type="datetimeFigureOut">
               <a:rPr lang="de-DE" smtClean="0"/>
-              <a:t>24.07.2020</a:t>
+              <a:t>20.01.2021</a:t>
             </a:fld>
             <a:endParaRPr lang="de-DE"/>
           </a:p>
@@ -1242,7 +1242,7 @@
           <a:p>
             <a:fld id="{6D3EBFE4-0E72-47F8-BA46-312F5F36F48F}" type="datetimeFigureOut">
               <a:rPr lang="de-DE" smtClean="0"/>
-              <a:t>24.07.2020</a:t>
+              <a:t>20.01.2021</a:t>
             </a:fld>
             <a:endParaRPr lang="de-DE"/>
           </a:p>
@@ -1609,7 +1609,7 @@
           <a:p>
             <a:fld id="{6D3EBFE4-0E72-47F8-BA46-312F5F36F48F}" type="datetimeFigureOut">
               <a:rPr lang="de-DE" smtClean="0"/>
-              <a:t>24.07.2020</a:t>
+              <a:t>20.01.2021</a:t>
             </a:fld>
             <a:endParaRPr lang="de-DE"/>
           </a:p>
@@ -1727,7 +1727,7 @@
           <a:p>
             <a:fld id="{6D3EBFE4-0E72-47F8-BA46-312F5F36F48F}" type="datetimeFigureOut">
               <a:rPr lang="de-DE" smtClean="0"/>
-              <a:t>24.07.2020</a:t>
+              <a:t>20.01.2021</a:t>
             </a:fld>
             <a:endParaRPr lang="de-DE"/>
           </a:p>
@@ -1822,7 +1822,7 @@
           <a:p>
             <a:fld id="{6D3EBFE4-0E72-47F8-BA46-312F5F36F48F}" type="datetimeFigureOut">
               <a:rPr lang="de-DE" smtClean="0"/>
-              <a:t>24.07.2020</a:t>
+              <a:t>20.01.2021</a:t>
             </a:fld>
             <a:endParaRPr lang="de-DE"/>
           </a:p>
@@ -2099,7 +2099,7 @@
           <a:p>
             <a:fld id="{6D3EBFE4-0E72-47F8-BA46-312F5F36F48F}" type="datetimeFigureOut">
               <a:rPr lang="de-DE" smtClean="0"/>
-              <a:t>24.07.2020</a:t>
+              <a:t>20.01.2021</a:t>
             </a:fld>
             <a:endParaRPr lang="de-DE"/>
           </a:p>
@@ -2352,7 +2352,7 @@
           <a:p>
             <a:fld id="{6D3EBFE4-0E72-47F8-BA46-312F5F36F48F}" type="datetimeFigureOut">
               <a:rPr lang="de-DE" smtClean="0"/>
-              <a:t>24.07.2020</a:t>
+              <a:t>20.01.2021</a:t>
             </a:fld>
             <a:endParaRPr lang="de-DE"/>
           </a:p>
@@ -2565,7 +2565,7 @@
           <a:p>
             <a:fld id="{6D3EBFE4-0E72-47F8-BA46-312F5F36F48F}" type="datetimeFigureOut">
               <a:rPr lang="de-DE" smtClean="0"/>
-              <a:t>24.07.2020</a:t>
+              <a:t>20.01.2021</a:t>
             </a:fld>
             <a:endParaRPr lang="de-DE"/>
           </a:p>
@@ -4027,7 +4027,7 @@
                       <m:sSub>
                         <m:sSubPr>
                           <m:ctrlPr>
-                            <a:rPr lang="de-DE" sz="2000" b="1" i="1" smtClean="0">
+                            <a:rPr lang="de-DE" sz="2400" b="1" i="1" smtClean="0">
                               <a:solidFill>
                                 <a:schemeClr val="tx2">
                                   <a:lumMod val="50000"/>
@@ -4039,7 +4039,7 @@
                         </m:sSubPr>
                         <m:e>
                           <m:r>
-                            <a:rPr lang="de-DE" sz="2000" b="1" i="1" smtClean="0">
+                            <a:rPr lang="de-DE" sz="2400" b="1" i="1" smtClean="0">
                               <a:solidFill>
                                 <a:schemeClr val="tx2">
                                   <a:lumMod val="50000"/>
@@ -4052,7 +4052,7 @@
                         </m:e>
                         <m:sub>
                           <m:r>
-                            <a:rPr lang="de-DE" sz="2000" b="1" i="1" smtClean="0">
+                            <a:rPr lang="de-DE" sz="2400" b="1" i="1" smtClean="0">
                               <a:solidFill>
                                 <a:schemeClr val="tx2">
                                   <a:lumMod val="50000"/>
@@ -4067,7 +4067,7 @@
                     </m:oMath>
                   </m:oMathPara>
                 </a14:m>
-                <a:endParaRPr lang="de-DE" sz="2000" b="1" dirty="0"/>
+                <a:endParaRPr lang="de-DE" sz="2400" b="1" dirty="0"/>
               </a:p>
             </p:txBody>
           </p:sp>
@@ -4092,7 +4092,7 @@
               <a:blipFill>
                 <a:blip r:embed="rId2"/>
                 <a:stretch>
-                  <a:fillRect/>
+                  <a:fillRect l="-6723"/>
                 </a:stretch>
               </a:blipFill>
               <a:ln>
@@ -4128,8 +4128,8 @@
             </p:nvSpPr>
             <p:spPr>
               <a:xfrm>
-                <a:off x="9053702" y="654803"/>
-                <a:ext cx="588935" cy="1449092"/>
+                <a:off x="8909052" y="654803"/>
+                <a:ext cx="733586" cy="1337990"/>
               </a:xfrm>
               <a:prstGeom prst="roundRect">
                 <a:avLst/>
@@ -4169,20 +4169,20 @@
                 <a14:m>
                   <m:oMathPara xmlns:m="http://schemas.openxmlformats.org/officeDocument/2006/math">
                     <m:oMathParaPr>
-                      <m:jc m:val="centerGroup"/>
+                      <m:jc m:val="center"/>
                     </m:oMathParaPr>
                     <m:oMath xmlns:m="http://schemas.openxmlformats.org/officeDocument/2006/math">
                       <m:sSubSup>
                         <m:sSubSupPr>
                           <m:ctrlPr>
-                            <a:rPr lang="de-DE" b="0" i="1" smtClean="0">
+                            <a:rPr lang="de-DE" sz="2400" i="1">
                               <a:latin typeface="Cambria Math" panose="02040503050406030204" pitchFamily="18" charset="0"/>
                             </a:rPr>
                           </m:ctrlPr>
                         </m:sSubSupPr>
                         <m:e>
                           <m:r>
-                            <a:rPr lang="de-DE" b="0" i="1" smtClean="0">
+                            <a:rPr lang="de-DE" sz="2400" i="1">
                               <a:latin typeface="Cambria Math" panose="02040503050406030204" pitchFamily="18" charset="0"/>
                             </a:rPr>
                             <m:t>𝑊</m:t>
@@ -4190,7 +4190,7 @@
                         </m:e>
                         <m:sub>
                           <m:r>
-                            <a:rPr lang="de-DE" b="0" i="1" smtClean="0">
+                            <a:rPr lang="de-DE" sz="2400" i="1">
                               <a:latin typeface="Cambria Math" panose="02040503050406030204" pitchFamily="18" charset="0"/>
                             </a:rPr>
                             <m:t>𝑜𝑢𝑡</m:t>
@@ -4200,14 +4200,14 @@
                           <m:sSub>
                             <m:sSubPr>
                               <m:ctrlPr>
-                                <a:rPr lang="de-DE" b="0" i="1" smtClean="0">
+                                <a:rPr lang="de-DE" sz="2400" i="1">
                                   <a:latin typeface="Cambria Math" panose="02040503050406030204" pitchFamily="18" charset="0"/>
                                 </a:rPr>
                               </m:ctrlPr>
                             </m:sSubPr>
                             <m:e>
                               <m:r>
-                                <a:rPr lang="de-DE" b="0" i="1" smtClean="0">
+                                <a:rPr lang="de-DE" sz="2400" i="1">
                                   <a:latin typeface="Cambria Math" panose="02040503050406030204" pitchFamily="18" charset="0"/>
                                 </a:rPr>
                                 <m:t>𝑢</m:t>
@@ -4215,7 +4215,7 @@
                             </m:e>
                             <m:sub>
                               <m:r>
-                                <a:rPr lang="de-DE" b="0" i="1" smtClean="0">
+                                <a:rPr lang="de-DE" sz="2400" i="1">
                                   <a:latin typeface="Cambria Math" panose="02040503050406030204" pitchFamily="18" charset="0"/>
                                 </a:rPr>
                                 <m:t>1</m:t>
@@ -4227,11 +4227,7 @@
                     </m:oMath>
                   </m:oMathPara>
                 </a14:m>
-                <a:endParaRPr lang="de-DE" dirty="0"/>
-              </a:p>
-              <a:p>
-                <a:pPr algn="ctr"/>
-                <a:endParaRPr lang="de-DE" dirty="0" smtClean="0"/>
+                <a:endParaRPr lang="de-DE" sz="2400" dirty="0" smtClean="0"/>
               </a:p>
             </p:txBody>
           </p:sp>
@@ -4247,8 +4243,8 @@
             </p:nvSpPr>
             <p:spPr>
               <a:xfrm>
-                <a:off x="9053702" y="654803"/>
-                <a:ext cx="588935" cy="1449092"/>
+                <a:off x="8909052" y="654803"/>
+                <a:ext cx="733586" cy="1337990"/>
               </a:xfrm>
               <a:prstGeom prst="roundRect">
                 <a:avLst/>
@@ -4256,7 +4252,7 @@
               <a:blipFill>
                 <a:blip r:embed="rId3"/>
                 <a:stretch>
-                  <a:fillRect l="-6061"/>
+                  <a:fillRect/>
                 </a:stretch>
               </a:blipFill>
               <a:ln>
@@ -4292,8 +4288,8 @@
             </p:nvSpPr>
             <p:spPr>
               <a:xfrm>
-                <a:off x="9053703" y="2454803"/>
-                <a:ext cx="588935" cy="1449092"/>
+                <a:off x="8909053" y="2454803"/>
+                <a:ext cx="733586" cy="1337990"/>
               </a:xfrm>
               <a:prstGeom prst="roundRect">
                 <a:avLst/>
@@ -4333,20 +4329,20 @@
                 <a14:m>
                   <m:oMathPara xmlns:m="http://schemas.openxmlformats.org/officeDocument/2006/math">
                     <m:oMathParaPr>
-                      <m:jc m:val="centerGroup"/>
+                      <m:jc m:val="center"/>
                     </m:oMathParaPr>
                     <m:oMath xmlns:m="http://schemas.openxmlformats.org/officeDocument/2006/math">
                       <m:sSubSup>
                         <m:sSubSupPr>
                           <m:ctrlPr>
-                            <a:rPr lang="de-DE" i="1" smtClean="0">
+                            <a:rPr lang="de-DE" sz="2400" i="1" smtClean="0">
                               <a:latin typeface="Cambria Math" panose="02040503050406030204" pitchFamily="18" charset="0"/>
                             </a:rPr>
                           </m:ctrlPr>
                         </m:sSubSupPr>
                         <m:e>
                           <m:r>
-                            <a:rPr lang="de-DE" i="1">
+                            <a:rPr lang="de-DE" sz="2400" i="1">
                               <a:latin typeface="Cambria Math" panose="02040503050406030204" pitchFamily="18" charset="0"/>
                             </a:rPr>
                             <m:t>𝑊</m:t>
@@ -4354,7 +4350,7 @@
                         </m:e>
                         <m:sub>
                           <m:r>
-                            <a:rPr lang="de-DE" i="1">
+                            <a:rPr lang="de-DE" sz="2400" i="1">
                               <a:latin typeface="Cambria Math" panose="02040503050406030204" pitchFamily="18" charset="0"/>
                             </a:rPr>
                             <m:t>𝑜𝑢𝑡</m:t>
@@ -4364,14 +4360,14 @@
                           <m:sSub>
                             <m:sSubPr>
                               <m:ctrlPr>
-                                <a:rPr lang="de-DE" i="1">
+                                <a:rPr lang="de-DE" sz="2400" i="1">
                                   <a:latin typeface="Cambria Math" panose="02040503050406030204" pitchFamily="18" charset="0"/>
                                 </a:rPr>
                               </m:ctrlPr>
                             </m:sSubPr>
                             <m:e>
                               <m:r>
-                                <a:rPr lang="de-DE" i="1">
+                                <a:rPr lang="de-DE" sz="2400" i="1">
                                   <a:latin typeface="Cambria Math" panose="02040503050406030204" pitchFamily="18" charset="0"/>
                                 </a:rPr>
                                 <m:t>𝑢</m:t>
@@ -4379,7 +4375,7 @@
                             </m:e>
                             <m:sub>
                               <m:r>
-                                <a:rPr lang="de-DE" b="0" i="1" smtClean="0">
+                                <a:rPr lang="de-DE" sz="2400" b="0" i="1" smtClean="0">
                                   <a:latin typeface="Cambria Math" panose="02040503050406030204" pitchFamily="18" charset="0"/>
                                 </a:rPr>
                                 <m:t>2</m:t>
@@ -4391,7 +4387,7 @@
                     </m:oMath>
                   </m:oMathPara>
                 </a14:m>
-                <a:endParaRPr lang="de-DE" dirty="0"/>
+                <a:endParaRPr lang="de-DE" sz="2400" dirty="0"/>
               </a:p>
             </p:txBody>
           </p:sp>
@@ -4407,8 +4403,8 @@
             </p:nvSpPr>
             <p:spPr>
               <a:xfrm>
-                <a:off x="9053703" y="2454803"/>
-                <a:ext cx="588935" cy="1449092"/>
+                <a:off x="8909053" y="2454803"/>
+                <a:ext cx="733586" cy="1337990"/>
               </a:xfrm>
               <a:prstGeom prst="roundRect">
                 <a:avLst/>
@@ -4416,7 +4412,7 @@
               <a:blipFill>
                 <a:blip r:embed="rId4"/>
                 <a:stretch>
-                  <a:fillRect l="-6061"/>
+                  <a:fillRect/>
                 </a:stretch>
               </a:blipFill>
               <a:ln>
@@ -4452,8 +4448,8 @@
             </p:nvSpPr>
             <p:spPr>
               <a:xfrm>
-                <a:off x="9053701" y="4262710"/>
-                <a:ext cx="588935" cy="1449092"/>
+                <a:off x="8909051" y="4262710"/>
+                <a:ext cx="733586" cy="1337990"/>
               </a:xfrm>
               <a:prstGeom prst="roundRect">
                 <a:avLst/>
@@ -4493,20 +4489,20 @@
                 <a14:m>
                   <m:oMathPara xmlns:m="http://schemas.openxmlformats.org/officeDocument/2006/math">
                     <m:oMathParaPr>
-                      <m:jc m:val="centerGroup"/>
+                      <m:jc m:val="center"/>
                     </m:oMathParaPr>
                     <m:oMath xmlns:m="http://schemas.openxmlformats.org/officeDocument/2006/math">
                       <m:sSubSup>
                         <m:sSubSupPr>
                           <m:ctrlPr>
-                            <a:rPr lang="de-DE" i="1" smtClean="0">
+                            <a:rPr lang="de-DE" sz="2400" i="1" smtClean="0">
                               <a:latin typeface="Cambria Math" panose="02040503050406030204" pitchFamily="18" charset="0"/>
                             </a:rPr>
                           </m:ctrlPr>
                         </m:sSubSupPr>
                         <m:e>
                           <m:r>
-                            <a:rPr lang="de-DE" i="1">
+                            <a:rPr lang="de-DE" sz="2400" i="1">
                               <a:latin typeface="Cambria Math" panose="02040503050406030204" pitchFamily="18" charset="0"/>
                             </a:rPr>
                             <m:t>𝑊</m:t>
@@ -4514,7 +4510,7 @@
                         </m:e>
                         <m:sub>
                           <m:r>
-                            <a:rPr lang="de-DE" i="1">
+                            <a:rPr lang="de-DE" sz="2400" i="1">
                               <a:latin typeface="Cambria Math" panose="02040503050406030204" pitchFamily="18" charset="0"/>
                             </a:rPr>
                             <m:t>𝑜𝑢𝑡</m:t>
@@ -4524,14 +4520,14 @@
                           <m:sSub>
                             <m:sSubPr>
                               <m:ctrlPr>
-                                <a:rPr lang="de-DE" i="1">
+                                <a:rPr lang="de-DE" sz="2400" i="1">
                                   <a:latin typeface="Cambria Math" panose="02040503050406030204" pitchFamily="18" charset="0"/>
                                 </a:rPr>
                               </m:ctrlPr>
                             </m:sSubPr>
                             <m:e>
                               <m:r>
-                                <a:rPr lang="de-DE" i="1">
+                                <a:rPr lang="de-DE" sz="2400" i="1">
                                   <a:latin typeface="Cambria Math" panose="02040503050406030204" pitchFamily="18" charset="0"/>
                                 </a:rPr>
                                 <m:t>𝑢</m:t>
@@ -4539,7 +4535,7 @@
                             </m:e>
                             <m:sub>
                               <m:r>
-                                <a:rPr lang="de-DE" b="0" i="1" smtClean="0">
+                                <a:rPr lang="de-DE" sz="2400" b="0" i="1" smtClean="0">
                                   <a:latin typeface="Cambria Math" panose="02040503050406030204" pitchFamily="18" charset="0"/>
                                 </a:rPr>
                                 <m:t>3</m:t>
@@ -4551,7 +4547,7 @@
                     </m:oMath>
                   </m:oMathPara>
                 </a14:m>
-                <a:endParaRPr lang="de-DE" dirty="0"/>
+                <a:endParaRPr lang="de-DE" sz="2400" dirty="0"/>
               </a:p>
             </p:txBody>
           </p:sp>
@@ -4567,8 +4563,8 @@
             </p:nvSpPr>
             <p:spPr>
               <a:xfrm>
-                <a:off x="9053701" y="4262710"/>
-                <a:ext cx="588935" cy="1449092"/>
+                <a:off x="8909051" y="4262710"/>
+                <a:ext cx="733586" cy="1337990"/>
               </a:xfrm>
               <a:prstGeom prst="roundRect">
                 <a:avLst/>
@@ -4576,7 +4572,7 @@
               <a:blipFill>
                 <a:blip r:embed="rId5"/>
                 <a:stretch>
-                  <a:fillRect l="-6061"/>
+                  <a:fillRect/>
                 </a:stretch>
               </a:blipFill>
               <a:ln>
@@ -4613,14 +4609,14 @@
         </p:nvCxnSpPr>
         <p:spPr>
           <a:xfrm flipH="1">
-            <a:off x="2433233" y="1379349"/>
-            <a:ext cx="7209404" cy="1800000"/>
+            <a:off x="2433233" y="1323798"/>
+            <a:ext cx="7209405" cy="1855551"/>
           </a:xfrm>
           <a:prstGeom prst="bentConnector5">
             <a:avLst>
-              <a:gd name="adj1" fmla="val -9651"/>
-              <a:gd name="adj2" fmla="val 269574"/>
-              <a:gd name="adj3" fmla="val 112407"/>
+              <a:gd name="adj1" fmla="val -9425"/>
+              <a:gd name="adj2" fmla="val 265107"/>
+              <a:gd name="adj3" fmla="val 113623"/>
             </a:avLst>
           </a:prstGeom>
           <a:ln w="38100">
@@ -4658,14 +4654,14 @@
         </p:nvCxnSpPr>
         <p:spPr>
           <a:xfrm flipH="1">
-            <a:off x="2433233" y="3179349"/>
-            <a:ext cx="7209405" cy="12700"/>
+            <a:off x="2433233" y="3123798"/>
+            <a:ext cx="7209406" cy="55551"/>
           </a:xfrm>
           <a:prstGeom prst="bentConnector5">
             <a:avLst>
-              <a:gd name="adj1" fmla="val -9650"/>
-              <a:gd name="adj2" fmla="val 24034102"/>
-              <a:gd name="adj3" fmla="val 112407"/>
+              <a:gd name="adj1" fmla="val -9337"/>
+              <a:gd name="adj2" fmla="val 5618833"/>
+              <a:gd name="adj3" fmla="val 113623"/>
             </a:avLst>
           </a:prstGeom>
           <a:ln w="38100">
@@ -4704,13 +4700,13 @@
         <p:spPr>
           <a:xfrm flipH="1" flipV="1">
             <a:off x="2433233" y="3179349"/>
-            <a:ext cx="7209403" cy="1807907"/>
+            <a:ext cx="7209404" cy="1752356"/>
           </a:xfrm>
           <a:prstGeom prst="bentConnector5">
             <a:avLst>
-              <a:gd name="adj1" fmla="val -9650"/>
-              <a:gd name="adj2" fmla="val -69269"/>
-              <a:gd name="adj3" fmla="val 112408"/>
+              <a:gd name="adj1" fmla="val -9395"/>
+              <a:gd name="adj2" fmla="val -75219"/>
+              <a:gd name="adj3" fmla="val 113623"/>
             </a:avLst>
           </a:prstGeom>
           <a:ln w="38100">
@@ -4789,8 +4785,8 @@
         </p:nvCxnSpPr>
         <p:spPr>
           <a:xfrm flipV="1">
-            <a:off x="7707050" y="1379349"/>
-            <a:ext cx="1346652" cy="1800000"/>
+            <a:off x="7707050" y="1323798"/>
+            <a:ext cx="1202002" cy="1855551"/>
           </a:xfrm>
           <a:prstGeom prst="straightConnector1">
             <a:avLst/>
@@ -4829,9 +4825,9 @@
           <p:nvPr/>
         </p:nvCxnSpPr>
         <p:spPr>
-          <a:xfrm>
-            <a:off x="7707050" y="3179349"/>
-            <a:ext cx="1346653" cy="0"/>
+          <a:xfrm flipV="1">
+            <a:off x="7707050" y="3123798"/>
+            <a:ext cx="1202003" cy="55551"/>
           </a:xfrm>
           <a:prstGeom prst="straightConnector1">
             <a:avLst/>
@@ -4872,7 +4868,7 @@
         <p:spPr>
           <a:xfrm>
             <a:off x="7707050" y="3179349"/>
-            <a:ext cx="1346651" cy="1807907"/>
+            <a:ext cx="1202001" cy="1752356"/>
           </a:xfrm>
           <a:prstGeom prst="straightConnector1">
             <a:avLst/>
@@ -6236,8 +6232,8 @@
             </p:nvSpPr>
             <p:spPr>
               <a:xfrm>
-                <a:off x="1421296" y="2796194"/>
-                <a:ext cx="655982" cy="369332"/>
+                <a:off x="1449259" y="2699888"/>
+                <a:ext cx="655982" cy="461665"/>
               </a:xfrm>
               <a:prstGeom prst="rect">
                 <a:avLst/>
@@ -6250,6 +6246,7 @@
               </a:bodyPr>
               <a:lstStyle/>
               <a:p>
+                <a:pPr/>
                 <a14:m>
                   <m:oMathPara xmlns:m="http://schemas.openxmlformats.org/officeDocument/2006/math">
                     <m:oMathParaPr>
@@ -6257,7 +6254,7 @@
                     </m:oMathParaPr>
                     <m:oMath xmlns:m="http://schemas.openxmlformats.org/officeDocument/2006/math">
                       <m:r>
-                        <a:rPr lang="de-DE" b="1" i="1" smtClean="0">
+                        <a:rPr lang="de-DE" sz="2400" b="1" i="1" smtClean="0">
                           <a:solidFill>
                             <a:schemeClr val="tx2">
                               <a:lumMod val="50000"/>
@@ -6270,7 +6267,7 @@
                       <m:d>
                         <m:dPr>
                           <m:ctrlPr>
-                            <a:rPr lang="de-DE" b="1" i="1" smtClean="0">
+                            <a:rPr lang="de-DE" sz="2400" b="1" i="1" smtClean="0">
                               <a:solidFill>
                                 <a:schemeClr val="tx2">
                                   <a:lumMod val="50000"/>
@@ -6282,7 +6279,7 @@
                         </m:dPr>
                         <m:e>
                           <m:r>
-                            <a:rPr lang="de-DE" b="1" i="1" smtClean="0">
+                            <a:rPr lang="de-DE" sz="2400" b="1" i="1" smtClean="0">
                               <a:solidFill>
                                 <a:schemeClr val="tx2">
                                   <a:lumMod val="50000"/>
@@ -6297,7 +6294,7 @@
                     </m:oMath>
                   </m:oMathPara>
                 </a14:m>
-                <a:endParaRPr lang="de-DE" b="1" dirty="0">
+                <a:endParaRPr lang="de-DE" sz="2400" b="1" dirty="0">
                   <a:solidFill>
                     <a:schemeClr val="tx2">
                       <a:lumMod val="50000"/>
@@ -6319,8 +6316,8 @@
             </p:nvSpPr>
             <p:spPr>
               <a:xfrm>
-                <a:off x="1421296" y="2796194"/>
-                <a:ext cx="655982" cy="369332"/>
+                <a:off x="1449259" y="2699888"/>
+                <a:ext cx="655982" cy="461665"/>
               </a:xfrm>
               <a:prstGeom prst="rect">
                 <a:avLst/>
@@ -6357,8 +6354,8 @@
             </p:nvSpPr>
             <p:spPr>
               <a:xfrm>
-                <a:off x="9177830" y="5779136"/>
-                <a:ext cx="1209514" cy="369332"/>
+                <a:off x="8807450" y="5779136"/>
+                <a:ext cx="1579894" cy="461665"/>
               </a:xfrm>
               <a:prstGeom prst="rect">
                 <a:avLst/>
@@ -6371,6 +6368,7 @@
               </a:bodyPr>
               <a:lstStyle/>
               <a:p>
+                <a:pPr/>
                 <a14:m>
                   <m:oMathPara xmlns:m="http://schemas.openxmlformats.org/officeDocument/2006/math">
                     <m:oMathParaPr>
@@ -6378,7 +6376,7 @@
                     </m:oMathParaPr>
                     <m:oMath xmlns:m="http://schemas.openxmlformats.org/officeDocument/2006/math">
                       <m:r>
-                        <a:rPr lang="de-DE" b="1" i="1" smtClean="0">
+                        <a:rPr lang="de-DE" sz="2400" b="1" i="1" smtClean="0">
                           <a:solidFill>
                             <a:schemeClr val="tx2">
                               <a:lumMod val="50000"/>
@@ -6391,7 +6389,7 @@
                       <m:d>
                         <m:dPr>
                           <m:ctrlPr>
-                            <a:rPr lang="de-DE" b="1" i="1" smtClean="0">
+                            <a:rPr lang="de-DE" sz="2400" b="1" i="1" smtClean="0">
                               <a:solidFill>
                                 <a:schemeClr val="tx2">
                                   <a:lumMod val="50000"/>
@@ -6403,7 +6401,7 @@
                         </m:dPr>
                         <m:e>
                           <m:r>
-                            <a:rPr lang="de-DE" b="1" i="1" smtClean="0">
+                            <a:rPr lang="de-DE" sz="2400" b="1" i="1" smtClean="0">
                               <a:solidFill>
                                 <a:schemeClr val="tx2">
                                   <a:lumMod val="50000"/>
@@ -6414,7 +6412,7 @@
                             <m:t>𝒕</m:t>
                           </m:r>
                           <m:r>
-                            <a:rPr lang="de-DE" b="1" i="1" smtClean="0">
+                            <a:rPr lang="de-DE" sz="2400" b="1" i="1" smtClean="0">
                               <a:solidFill>
                                 <a:schemeClr val="tx2">
                                   <a:lumMod val="50000"/>
@@ -6425,7 +6423,7 @@
                             <m:t>+</m:t>
                           </m:r>
                           <m:r>
-                            <a:rPr lang="de-DE" b="1" i="0" smtClean="0">
+                            <a:rPr lang="de-DE" sz="2400" b="1" i="0" smtClean="0">
                               <a:solidFill>
                                 <a:schemeClr val="tx2">
                                   <a:lumMod val="50000"/>
@@ -6436,7 +6434,7 @@
                             <m:t>𝚫</m:t>
                           </m:r>
                           <m:r>
-                            <a:rPr lang="de-DE" b="1" i="1" smtClean="0">
+                            <a:rPr lang="de-DE" sz="2400" b="1" i="1" smtClean="0">
                               <a:solidFill>
                                 <a:schemeClr val="tx2">
                                   <a:lumMod val="50000"/>
@@ -6451,7 +6449,7 @@
                     </m:oMath>
                   </m:oMathPara>
                 </a14:m>
-                <a:endParaRPr lang="de-DE" b="1" dirty="0">
+                <a:endParaRPr lang="de-DE" sz="2400" b="1" dirty="0">
                   <a:solidFill>
                     <a:schemeClr val="tx2">
                       <a:lumMod val="50000"/>
@@ -6473,8 +6471,8 @@
             </p:nvSpPr>
             <p:spPr>
               <a:xfrm>
-                <a:off x="9177830" y="5779136"/>
-                <a:ext cx="1209514" cy="369332"/>
+                <a:off x="8807450" y="5779136"/>
+                <a:ext cx="1579894" cy="461665"/>
               </a:xfrm>
               <a:prstGeom prst="rect">
                 <a:avLst/>
@@ -6509,8 +6507,8 @@
         </p:nvSpPr>
         <p:spPr>
           <a:xfrm>
-            <a:off x="5082627" y="152606"/>
-            <a:ext cx="1605478" cy="367747"/>
+            <a:off x="4857089" y="187794"/>
+            <a:ext cx="2511931" cy="461665"/>
           </a:xfrm>
           <a:prstGeom prst="rect">
             <a:avLst/>
@@ -6524,10 +6522,10 @@
           <a:lstStyle/>
           <a:p>
             <a:r>
-              <a:rPr lang="de-DE" dirty="0" smtClean="0"/>
+              <a:rPr lang="de-DE" sz="2400" dirty="0" smtClean="0"/>
               <a:t>Reservoir Layer</a:t>
             </a:r>
-            <a:endParaRPr lang="de-DE" dirty="0"/>
+            <a:endParaRPr lang="de-DE" sz="2400" dirty="0"/>
           </a:p>
         </p:txBody>
       </p:sp>
@@ -6539,8 +6537,8 @@
         </p:nvSpPr>
         <p:spPr>
           <a:xfrm>
-            <a:off x="2173029" y="156036"/>
-            <a:ext cx="1233325" cy="367747"/>
+            <a:off x="2105241" y="187794"/>
+            <a:ext cx="1929660" cy="461665"/>
           </a:xfrm>
           <a:prstGeom prst="rect">
             <a:avLst/>
@@ -6554,10 +6552,10 @@
           <a:lstStyle/>
           <a:p>
             <a:r>
-              <a:rPr lang="de-DE" dirty="0" smtClean="0"/>
+              <a:rPr lang="de-DE" sz="2400" dirty="0" smtClean="0"/>
               <a:t>Input Layer</a:t>
             </a:r>
-            <a:endParaRPr lang="de-DE" dirty="0"/>
+            <a:endParaRPr lang="de-DE" sz="2400" dirty="0"/>
           </a:p>
         </p:txBody>
       </p:sp>
@@ -6569,8 +6567,8 @@
         </p:nvSpPr>
         <p:spPr>
           <a:xfrm>
-            <a:off x="8646347" y="148057"/>
-            <a:ext cx="1403641" cy="367747"/>
+            <a:off x="8191208" y="152064"/>
+            <a:ext cx="2196136" cy="461665"/>
           </a:xfrm>
           <a:prstGeom prst="rect">
             <a:avLst/>
@@ -6584,10 +6582,10 @@
           <a:lstStyle/>
           <a:p>
             <a:r>
-              <a:rPr lang="de-DE" dirty="0" smtClean="0"/>
+              <a:rPr lang="de-DE" sz="2400" dirty="0" smtClean="0"/>
               <a:t>Output Layer</a:t>
             </a:r>
-            <a:endParaRPr lang="de-DE" dirty="0"/>
+            <a:endParaRPr lang="de-DE" sz="2400" dirty="0"/>
           </a:p>
         </p:txBody>
       </p:sp>

</xml_diff>